<commit_message>
fix typos in DEEP slide deck
</commit_message>
<xml_diff>
--- a/MNIST with Tensorflow - Deep Model.pptx
+++ b/MNIST with Tensorflow - Deep Model.pptx
@@ -26,11 +26,12 @@
     <p:sldId id="286" r:id="rId20"/>
     <p:sldId id="288" r:id="rId21"/>
     <p:sldId id="289" r:id="rId22"/>
-    <p:sldId id="284" r:id="rId23"/>
-    <p:sldId id="290" r:id="rId24"/>
-    <p:sldId id="285" r:id="rId25"/>
-    <p:sldId id="291" r:id="rId26"/>
-    <p:sldId id="279" r:id="rId27"/>
+    <p:sldId id="292" r:id="rId23"/>
+    <p:sldId id="284" r:id="rId24"/>
+    <p:sldId id="290" r:id="rId25"/>
+    <p:sldId id="285" r:id="rId26"/>
+    <p:sldId id="291" r:id="rId27"/>
+    <p:sldId id="279" r:id="rId28"/>
   </p:sldIdLst>
   <p:sldSz cx="12192000" cy="6858000"/>
   <p:notesSz cx="6858000" cy="9144000"/>
@@ -1369,30 +1370,6 @@
     </pc:docChg>
   </pc:docChgLst>
   <pc:docChgLst>
-    <pc:chgData name="gene olafsen" userId="e5f59384b4ca89d9" providerId="Windows Live" clId="Web-{69C08D9D-4C46-41E4-8825-4676C20D2C0C}"/>
-    <pc:docChg chg="modSld">
-      <pc:chgData name="gene olafsen" userId="e5f59384b4ca89d9" providerId="Windows Live" clId="Web-{69C08D9D-4C46-41E4-8825-4676C20D2C0C}" dt="2017-12-12T02:26:30.655" v="7"/>
-      <pc:docMkLst>
-        <pc:docMk/>
-      </pc:docMkLst>
-      <pc:sldChg chg="modSp">
-        <pc:chgData name="gene olafsen" userId="e5f59384b4ca89d9" providerId="Windows Live" clId="Web-{69C08D9D-4C46-41E4-8825-4676C20D2C0C}" dt="2017-12-12T02:26:30.640" v="6"/>
-        <pc:sldMkLst>
-          <pc:docMk/>
-          <pc:sldMk cId="205511767" sldId="280"/>
-        </pc:sldMkLst>
-        <pc:spChg chg="mod">
-          <ac:chgData name="gene olafsen" userId="e5f59384b4ca89d9" providerId="Windows Live" clId="Web-{69C08D9D-4C46-41E4-8825-4676C20D2C0C}" dt="2017-12-12T02:26:30.640" v="6"/>
-          <ac:spMkLst>
-            <pc:docMk/>
-            <pc:sldMk cId="205511767" sldId="280"/>
-            <ac:spMk id="3" creationId="{CA3F276F-9B78-4D09-99B2-452FB454DBC2}"/>
-          </ac:spMkLst>
-        </pc:spChg>
-      </pc:sldChg>
-    </pc:docChg>
-  </pc:docChgLst>
-  <pc:docChgLst>
     <pc:chgData name="gene olafsen" userId="e5f59384b4ca89d9" providerId="Windows Live" clId="Web-{012F0C47-D9DC-4623-B635-F171F43D9473}"/>
     <pc:docChg chg="addSld delSld modSld modSection">
       <pc:chgData name="gene olafsen" userId="e5f59384b4ca89d9" providerId="Windows Live" clId="Web-{012F0C47-D9DC-4623-B635-F171F43D9473}" dt="2017-12-12T02:17:27.518" v="157"/>
@@ -1461,6 +1438,30 @@
       </pc:sldChg>
     </pc:docChg>
   </pc:docChgLst>
+  <pc:docChgLst>
+    <pc:chgData name="gene olafsen" userId="e5f59384b4ca89d9" providerId="Windows Live" clId="Web-{69C08D9D-4C46-41E4-8825-4676C20D2C0C}"/>
+    <pc:docChg chg="modSld">
+      <pc:chgData name="gene olafsen" userId="e5f59384b4ca89d9" providerId="Windows Live" clId="Web-{69C08D9D-4C46-41E4-8825-4676C20D2C0C}" dt="2017-12-12T02:26:30.655" v="7"/>
+      <pc:docMkLst>
+        <pc:docMk/>
+      </pc:docMkLst>
+      <pc:sldChg chg="modSp">
+        <pc:chgData name="gene olafsen" userId="e5f59384b4ca89d9" providerId="Windows Live" clId="Web-{69C08D9D-4C46-41E4-8825-4676C20D2C0C}" dt="2017-12-12T02:26:30.640" v="6"/>
+        <pc:sldMkLst>
+          <pc:docMk/>
+          <pc:sldMk cId="205511767" sldId="280"/>
+        </pc:sldMkLst>
+        <pc:spChg chg="mod">
+          <ac:chgData name="gene olafsen" userId="e5f59384b4ca89d9" providerId="Windows Live" clId="Web-{69C08D9D-4C46-41E4-8825-4676C20D2C0C}" dt="2017-12-12T02:26:30.640" v="6"/>
+          <ac:spMkLst>
+            <pc:docMk/>
+            <pc:sldMk cId="205511767" sldId="280"/>
+            <ac:spMk id="3" creationId="{CA3F276F-9B78-4D09-99B2-452FB454DBC2}"/>
+          </ac:spMkLst>
+        </pc:spChg>
+      </pc:sldChg>
+    </pc:docChg>
+  </pc:docChgLst>
 </pc:chgInfo>
 </file>
 
@@ -1514,7 +1515,7 @@
           <a:noFill/>
           <a:extLst>
             <a:ext uri="{909E8E84-426E-40dd-AFC4-6F175D3DCCD1}">
-              <a14:hiddenFill xmlns="" xmlns:a14="http://schemas.microsoft.com/office/drawing/2010/main">
+              <a14:hiddenFill xmlns:a14="http://schemas.microsoft.com/office/drawing/2010/main" xmlns="">
                 <a:solidFill>
                   <a:srgbClr val="FFFFFF"/>
                 </a:solidFill>
@@ -1574,7 +1575,7 @@
             </a:ln>
             <a:extLst>
               <a:ext uri="{91240B29-F687-4f45-9708-019B960494DF}">
-                <a14:hiddenLine xmlns="" xmlns:a14="http://schemas.microsoft.com/office/drawing/2010/main" w="9525">
+                <a14:hiddenLine xmlns:a14="http://schemas.microsoft.com/office/drawing/2010/main" xmlns="" w="9525">
                   <a:solidFill>
                     <a:srgbClr val="000000"/>
                   </a:solidFill>
@@ -1664,7 +1665,7 @@
             </a:ln>
             <a:extLst>
               <a:ext uri="{91240B29-F687-4f45-9708-019B960494DF}">
-                <a14:hiddenLine xmlns="" xmlns:a14="http://schemas.microsoft.com/office/drawing/2010/main" w="9525">
+                <a14:hiddenLine xmlns:a14="http://schemas.microsoft.com/office/drawing/2010/main" xmlns="" w="9525">
                   <a:solidFill>
                     <a:srgbClr val="000000"/>
                   </a:solidFill>
@@ -1754,7 +1755,7 @@
             </a:ln>
             <a:extLst>
               <a:ext uri="{91240B29-F687-4f45-9708-019B960494DF}">
-                <a14:hiddenLine xmlns="" xmlns:a14="http://schemas.microsoft.com/office/drawing/2010/main" w="9525">
+                <a14:hiddenLine xmlns:a14="http://schemas.microsoft.com/office/drawing/2010/main" xmlns="" w="9525">
                   <a:solidFill>
                     <a:srgbClr val="000000"/>
                   </a:solidFill>
@@ -1788,7 +1789,7 @@
             </a:ln>
             <a:extLst>
               <a:ext uri="{91240B29-F687-4f45-9708-019B960494DF}">
-                <a14:hiddenLine xmlns="" xmlns:a14="http://schemas.microsoft.com/office/drawing/2010/main" w="9525">
+                <a14:hiddenLine xmlns:a14="http://schemas.microsoft.com/office/drawing/2010/main" xmlns="" w="9525">
                   <a:solidFill>
                     <a:srgbClr val="000000"/>
                   </a:solidFill>
@@ -1878,7 +1879,7 @@
             </a:ln>
             <a:extLst>
               <a:ext uri="{91240B29-F687-4f45-9708-019B960494DF}">
-                <a14:hiddenLine xmlns="" xmlns:a14="http://schemas.microsoft.com/office/drawing/2010/main" w="9525">
+                <a14:hiddenLine xmlns:a14="http://schemas.microsoft.com/office/drawing/2010/main" xmlns="" w="9525">
                   <a:solidFill>
                     <a:srgbClr val="000000"/>
                   </a:solidFill>
@@ -1940,7 +1941,7 @@
             </a:ln>
             <a:extLst>
               <a:ext uri="{91240B29-F687-4f45-9708-019B960494DF}">
-                <a14:hiddenLine xmlns="" xmlns:a14="http://schemas.microsoft.com/office/drawing/2010/main" w="9525">
+                <a14:hiddenLine xmlns:a14="http://schemas.microsoft.com/office/drawing/2010/main" xmlns="" w="9525">
                   <a:solidFill>
                     <a:srgbClr val="000000"/>
                   </a:solidFill>
@@ -2002,7 +2003,7 @@
             </a:ln>
             <a:extLst>
               <a:ext uri="{91240B29-F687-4f45-9708-019B960494DF}">
-                <a14:hiddenLine xmlns="" xmlns:a14="http://schemas.microsoft.com/office/drawing/2010/main" w="9525">
+                <a14:hiddenLine xmlns:a14="http://schemas.microsoft.com/office/drawing/2010/main" xmlns="" w="9525">
                   <a:solidFill>
                     <a:srgbClr val="000000"/>
                   </a:solidFill>
@@ -2092,7 +2093,7 @@
             </a:ln>
             <a:extLst>
               <a:ext uri="{91240B29-F687-4f45-9708-019B960494DF}">
-                <a14:hiddenLine xmlns="" xmlns:a14="http://schemas.microsoft.com/office/drawing/2010/main" w="9525">
+                <a14:hiddenLine xmlns:a14="http://schemas.microsoft.com/office/drawing/2010/main" xmlns="" w="9525">
                   <a:solidFill>
                     <a:srgbClr val="000000"/>
                   </a:solidFill>
@@ -2154,7 +2155,7 @@
             </a:ln>
             <a:extLst>
               <a:ext uri="{91240B29-F687-4f45-9708-019B960494DF}">
-                <a14:hiddenLine xmlns="" xmlns:a14="http://schemas.microsoft.com/office/drawing/2010/main" w="9525">
+                <a14:hiddenLine xmlns:a14="http://schemas.microsoft.com/office/drawing/2010/main" xmlns="" w="9525">
                   <a:solidFill>
                     <a:srgbClr val="000000"/>
                   </a:solidFill>
@@ -2216,7 +2217,7 @@
             </a:ln>
             <a:extLst>
               <a:ext uri="{91240B29-F687-4f45-9708-019B960494DF}">
-                <a14:hiddenLine xmlns="" xmlns:a14="http://schemas.microsoft.com/office/drawing/2010/main" w="9525">
+                <a14:hiddenLine xmlns:a14="http://schemas.microsoft.com/office/drawing/2010/main" xmlns="" w="9525">
                   <a:solidFill>
                     <a:srgbClr val="000000"/>
                   </a:solidFill>
@@ -2306,7 +2307,7 @@
             </a:ln>
             <a:extLst>
               <a:ext uri="{91240B29-F687-4f45-9708-019B960494DF}">
-                <a14:hiddenLine xmlns="" xmlns:a14="http://schemas.microsoft.com/office/drawing/2010/main" w="9525">
+                <a14:hiddenLine xmlns:a14="http://schemas.microsoft.com/office/drawing/2010/main" xmlns="" w="9525">
                   <a:solidFill>
                     <a:srgbClr val="000000"/>
                   </a:solidFill>
@@ -2396,7 +2397,7 @@
             </a:ln>
             <a:extLst>
               <a:ext uri="{91240B29-F687-4f45-9708-019B960494DF}">
-                <a14:hiddenLine xmlns="" xmlns:a14="http://schemas.microsoft.com/office/drawing/2010/main" w="9525">
+                <a14:hiddenLine xmlns:a14="http://schemas.microsoft.com/office/drawing/2010/main" xmlns="" w="9525">
                   <a:solidFill>
                     <a:srgbClr val="000000"/>
                   </a:solidFill>
@@ -2458,7 +2459,7 @@
             </a:ln>
             <a:extLst>
               <a:ext uri="{91240B29-F687-4f45-9708-019B960494DF}">
-                <a14:hiddenLine xmlns="" xmlns:a14="http://schemas.microsoft.com/office/drawing/2010/main" w="9525">
+                <a14:hiddenLine xmlns:a14="http://schemas.microsoft.com/office/drawing/2010/main" xmlns="" w="9525">
                   <a:solidFill>
                     <a:srgbClr val="000000"/>
                   </a:solidFill>
@@ -2568,7 +2569,7 @@
             </a:ln>
             <a:extLst>
               <a:ext uri="{91240B29-F687-4f45-9708-019B960494DF}">
-                <a14:hiddenLine xmlns="" xmlns:a14="http://schemas.microsoft.com/office/drawing/2010/main" w="9525">
+                <a14:hiddenLine xmlns:a14="http://schemas.microsoft.com/office/drawing/2010/main" xmlns="" w="9525">
                   <a:solidFill>
                     <a:srgbClr val="000000"/>
                   </a:solidFill>
@@ -2630,7 +2631,7 @@
             </a:ln>
             <a:extLst>
               <a:ext uri="{91240B29-F687-4f45-9708-019B960494DF}">
-                <a14:hiddenLine xmlns="" xmlns:a14="http://schemas.microsoft.com/office/drawing/2010/main" w="9525">
+                <a14:hiddenLine xmlns:a14="http://schemas.microsoft.com/office/drawing/2010/main" xmlns="" w="9525">
                   <a:solidFill>
                     <a:srgbClr val="000000"/>
                   </a:solidFill>
@@ -2720,7 +2721,7 @@
             </a:ln>
             <a:extLst>
               <a:ext uri="{91240B29-F687-4f45-9708-019B960494DF}">
-                <a14:hiddenLine xmlns="" xmlns:a14="http://schemas.microsoft.com/office/drawing/2010/main" w="9525">
+                <a14:hiddenLine xmlns:a14="http://schemas.microsoft.com/office/drawing/2010/main" xmlns="" w="9525">
                   <a:solidFill>
                     <a:srgbClr val="000000"/>
                   </a:solidFill>
@@ -2810,7 +2811,7 @@
             </a:ln>
             <a:extLst>
               <a:ext uri="{91240B29-F687-4f45-9708-019B960494DF}">
-                <a14:hiddenLine xmlns="" xmlns:a14="http://schemas.microsoft.com/office/drawing/2010/main" w="9525">
+                <a14:hiddenLine xmlns:a14="http://schemas.microsoft.com/office/drawing/2010/main" xmlns="" w="9525">
                   <a:solidFill>
                     <a:srgbClr val="000000"/>
                   </a:solidFill>
@@ -2872,7 +2873,7 @@
             </a:ln>
             <a:extLst>
               <a:ext uri="{91240B29-F687-4f45-9708-019B960494DF}">
-                <a14:hiddenLine xmlns="" xmlns:a14="http://schemas.microsoft.com/office/drawing/2010/main" w="9525">
+                <a14:hiddenLine xmlns:a14="http://schemas.microsoft.com/office/drawing/2010/main" xmlns="" w="9525">
                   <a:solidFill>
                     <a:srgbClr val="000000"/>
                   </a:solidFill>
@@ -2962,7 +2963,7 @@
             </a:ln>
             <a:extLst>
               <a:ext uri="{91240B29-F687-4f45-9708-019B960494DF}">
-                <a14:hiddenLine xmlns="" xmlns:a14="http://schemas.microsoft.com/office/drawing/2010/main" w="9525">
+                <a14:hiddenLine xmlns:a14="http://schemas.microsoft.com/office/drawing/2010/main" xmlns="" w="9525">
                   <a:solidFill>
                     <a:srgbClr val="000000"/>
                   </a:solidFill>
@@ -3052,7 +3053,7 @@
             </a:ln>
             <a:extLst>
               <a:ext uri="{91240B29-F687-4f45-9708-019B960494DF}">
-                <a14:hiddenLine xmlns="" xmlns:a14="http://schemas.microsoft.com/office/drawing/2010/main" w="9525">
+                <a14:hiddenLine xmlns:a14="http://schemas.microsoft.com/office/drawing/2010/main" xmlns="" w="9525">
                   <a:solidFill>
                     <a:srgbClr val="000000"/>
                   </a:solidFill>
@@ -3108,7 +3109,7 @@
             </a:ln>
             <a:extLst>
               <a:ext uri="{91240B29-F687-4f45-9708-019B960494DF}">
-                <a14:hiddenLine xmlns="" xmlns:a14="http://schemas.microsoft.com/office/drawing/2010/main" w="9525">
+                <a14:hiddenLine xmlns:a14="http://schemas.microsoft.com/office/drawing/2010/main" xmlns="" w="9525">
                   <a:solidFill>
                     <a:srgbClr val="000000"/>
                   </a:solidFill>
@@ -3198,7 +3199,7 @@
             </a:ln>
             <a:extLst>
               <a:ext uri="{91240B29-F687-4f45-9708-019B960494DF}">
-                <a14:hiddenLine xmlns="" xmlns:a14="http://schemas.microsoft.com/office/drawing/2010/main" w="9525">
+                <a14:hiddenLine xmlns:a14="http://schemas.microsoft.com/office/drawing/2010/main" xmlns="" w="9525">
                   <a:solidFill>
                     <a:srgbClr val="000000"/>
                   </a:solidFill>
@@ -3254,7 +3255,7 @@
             </a:ln>
             <a:extLst>
               <a:ext uri="{91240B29-F687-4f45-9708-019B960494DF}">
-                <a14:hiddenLine xmlns="" xmlns:a14="http://schemas.microsoft.com/office/drawing/2010/main" w="9525">
+                <a14:hiddenLine xmlns:a14="http://schemas.microsoft.com/office/drawing/2010/main" xmlns="" w="9525">
                   <a:solidFill>
                     <a:srgbClr val="000000"/>
                   </a:solidFill>
@@ -3344,7 +3345,7 @@
             </a:ln>
             <a:extLst>
               <a:ext uri="{91240B29-F687-4f45-9708-019B960494DF}">
-                <a14:hiddenLine xmlns="" xmlns:a14="http://schemas.microsoft.com/office/drawing/2010/main" w="9525">
+                <a14:hiddenLine xmlns:a14="http://schemas.microsoft.com/office/drawing/2010/main" xmlns="" w="9525">
                   <a:solidFill>
                     <a:srgbClr val="000000"/>
                   </a:solidFill>
@@ -3412,7 +3413,7 @@
             </a:ln>
             <a:extLst>
               <a:ext uri="{91240B29-F687-4f45-9708-019B960494DF}">
-                <a14:hiddenLine xmlns="" xmlns:a14="http://schemas.microsoft.com/office/drawing/2010/main" w="9525">
+                <a14:hiddenLine xmlns:a14="http://schemas.microsoft.com/office/drawing/2010/main" xmlns="" w="9525">
                   <a:solidFill>
                     <a:srgbClr val="000000"/>
                   </a:solidFill>
@@ -3502,7 +3503,7 @@
             </a:ln>
             <a:extLst>
               <a:ext uri="{91240B29-F687-4f45-9708-019B960494DF}">
-                <a14:hiddenLine xmlns="" xmlns:a14="http://schemas.microsoft.com/office/drawing/2010/main" w="9525">
+                <a14:hiddenLine xmlns:a14="http://schemas.microsoft.com/office/drawing/2010/main" xmlns="" w="9525">
                   <a:solidFill>
                     <a:srgbClr val="000000"/>
                   </a:solidFill>
@@ -3570,7 +3571,7 @@
             </a:ln>
             <a:extLst>
               <a:ext uri="{91240B29-F687-4f45-9708-019B960494DF}">
-                <a14:hiddenLine xmlns="" xmlns:a14="http://schemas.microsoft.com/office/drawing/2010/main" w="9525">
+                <a14:hiddenLine xmlns:a14="http://schemas.microsoft.com/office/drawing/2010/main" xmlns="" w="9525">
                   <a:solidFill>
                     <a:srgbClr val="000000"/>
                   </a:solidFill>
@@ -3660,7 +3661,7 @@
             </a:ln>
             <a:extLst>
               <a:ext uri="{91240B29-F687-4f45-9708-019B960494DF}">
-                <a14:hiddenLine xmlns="" xmlns:a14="http://schemas.microsoft.com/office/drawing/2010/main" w="9525">
+                <a14:hiddenLine xmlns:a14="http://schemas.microsoft.com/office/drawing/2010/main" xmlns="" w="9525">
                   <a:solidFill>
                     <a:srgbClr val="000000"/>
                   </a:solidFill>
@@ -3694,7 +3695,7 @@
             </a:ln>
             <a:extLst>
               <a:ext uri="{91240B29-F687-4f45-9708-019B960494DF}">
-                <a14:hiddenLine xmlns="" xmlns:a14="http://schemas.microsoft.com/office/drawing/2010/main" w="9525">
+                <a14:hiddenLine xmlns:a14="http://schemas.microsoft.com/office/drawing/2010/main" xmlns="" w="9525">
                   <a:solidFill>
                     <a:srgbClr val="000000"/>
                   </a:solidFill>
@@ -3784,7 +3785,7 @@
             </a:ln>
             <a:extLst>
               <a:ext uri="{91240B29-F687-4f45-9708-019B960494DF}">
-                <a14:hiddenLine xmlns="" xmlns:a14="http://schemas.microsoft.com/office/drawing/2010/main" w="9525">
+                <a14:hiddenLine xmlns:a14="http://schemas.microsoft.com/office/drawing/2010/main" xmlns="" w="9525">
                   <a:solidFill>
                     <a:srgbClr val="000000"/>
                   </a:solidFill>
@@ -3846,7 +3847,7 @@
             </a:ln>
             <a:extLst>
               <a:ext uri="{91240B29-F687-4f45-9708-019B960494DF}">
-                <a14:hiddenLine xmlns="" xmlns:a14="http://schemas.microsoft.com/office/drawing/2010/main" w="9525">
+                <a14:hiddenLine xmlns:a14="http://schemas.microsoft.com/office/drawing/2010/main" xmlns="" w="9525">
                   <a:solidFill>
                     <a:srgbClr val="000000"/>
                   </a:solidFill>
@@ -3908,7 +3909,7 @@
             </a:ln>
             <a:extLst>
               <a:ext uri="{91240B29-F687-4f45-9708-019B960494DF}">
-                <a14:hiddenLine xmlns="" xmlns:a14="http://schemas.microsoft.com/office/drawing/2010/main" w="9525">
+                <a14:hiddenLine xmlns:a14="http://schemas.microsoft.com/office/drawing/2010/main" xmlns="" w="9525">
                   <a:solidFill>
                     <a:srgbClr val="000000"/>
                   </a:solidFill>
@@ -3998,7 +3999,7 @@
             </a:ln>
             <a:extLst>
               <a:ext uri="{91240B29-F687-4f45-9708-019B960494DF}">
-                <a14:hiddenLine xmlns="" xmlns:a14="http://schemas.microsoft.com/office/drawing/2010/main" w="9525">
+                <a14:hiddenLine xmlns:a14="http://schemas.microsoft.com/office/drawing/2010/main" xmlns="" w="9525">
                   <a:solidFill>
                     <a:srgbClr val="000000"/>
                   </a:solidFill>
@@ -4066,7 +4067,7 @@
             </a:ln>
             <a:extLst>
               <a:ext uri="{91240B29-F687-4f45-9708-019B960494DF}">
-                <a14:hiddenLine xmlns="" xmlns:a14="http://schemas.microsoft.com/office/drawing/2010/main" w="9525">
+                <a14:hiddenLine xmlns:a14="http://schemas.microsoft.com/office/drawing/2010/main" xmlns="" w="9525">
                   <a:solidFill>
                     <a:srgbClr val="000000"/>
                   </a:solidFill>
@@ -4128,7 +4129,7 @@
             </a:ln>
             <a:extLst>
               <a:ext uri="{91240B29-F687-4f45-9708-019B960494DF}">
-                <a14:hiddenLine xmlns="" xmlns:a14="http://schemas.microsoft.com/office/drawing/2010/main" w="9525">
+                <a14:hiddenLine xmlns:a14="http://schemas.microsoft.com/office/drawing/2010/main" xmlns="" w="9525">
                   <a:solidFill>
                     <a:srgbClr val="000000"/>
                   </a:solidFill>
@@ -4218,7 +4219,7 @@
             </a:ln>
             <a:extLst>
               <a:ext uri="{91240B29-F687-4f45-9708-019B960494DF}">
-                <a14:hiddenLine xmlns="" xmlns:a14="http://schemas.microsoft.com/office/drawing/2010/main" w="9525">
+                <a14:hiddenLine xmlns:a14="http://schemas.microsoft.com/office/drawing/2010/main" xmlns="" w="9525">
                   <a:solidFill>
                     <a:srgbClr val="000000"/>
                   </a:solidFill>
@@ -4280,7 +4281,7 @@
             </a:ln>
             <a:extLst>
               <a:ext uri="{91240B29-F687-4f45-9708-019B960494DF}">
-                <a14:hiddenLine xmlns="" xmlns:a14="http://schemas.microsoft.com/office/drawing/2010/main" w="9525">
+                <a14:hiddenLine xmlns:a14="http://schemas.microsoft.com/office/drawing/2010/main" xmlns="" w="9525">
                   <a:solidFill>
                     <a:srgbClr val="000000"/>
                   </a:solidFill>
@@ -4370,7 +4371,7 @@
             </a:ln>
             <a:extLst>
               <a:ext uri="{91240B29-F687-4f45-9708-019B960494DF}">
-                <a14:hiddenLine xmlns="" xmlns:a14="http://schemas.microsoft.com/office/drawing/2010/main" w="9525">
+                <a14:hiddenLine xmlns:a14="http://schemas.microsoft.com/office/drawing/2010/main" xmlns="" w="9525">
                   <a:solidFill>
                     <a:srgbClr val="000000"/>
                   </a:solidFill>
@@ -4432,7 +4433,7 @@
             </a:ln>
             <a:extLst>
               <a:ext uri="{91240B29-F687-4f45-9708-019B960494DF}">
-                <a14:hiddenLine xmlns="" xmlns:a14="http://schemas.microsoft.com/office/drawing/2010/main" w="9525">
+                <a14:hiddenLine xmlns:a14="http://schemas.microsoft.com/office/drawing/2010/main" xmlns="" w="9525">
                   <a:solidFill>
                     <a:srgbClr val="000000"/>
                   </a:solidFill>
@@ -4522,7 +4523,7 @@
             </a:ln>
             <a:extLst>
               <a:ext uri="{91240B29-F687-4f45-9708-019B960494DF}">
-                <a14:hiddenLine xmlns="" xmlns:a14="http://schemas.microsoft.com/office/drawing/2010/main" w="9525">
+                <a14:hiddenLine xmlns:a14="http://schemas.microsoft.com/office/drawing/2010/main" xmlns="" w="9525">
                   <a:solidFill>
                     <a:srgbClr val="000000"/>
                   </a:solidFill>
@@ -4556,7 +4557,7 @@
             </a:ln>
             <a:extLst>
               <a:ext uri="{91240B29-F687-4f45-9708-019B960494DF}">
-                <a14:hiddenLine xmlns="" xmlns:a14="http://schemas.microsoft.com/office/drawing/2010/main" w="9525">
+                <a14:hiddenLine xmlns:a14="http://schemas.microsoft.com/office/drawing/2010/main" xmlns="" w="9525">
                   <a:solidFill>
                     <a:srgbClr val="000000"/>
                   </a:solidFill>
@@ -4621,7 +4622,7 @@
             </a:ln>
             <a:extLst>
               <a:ext uri="{91240B29-F687-4f45-9708-019B960494DF}">
-                <a14:hiddenLine xmlns="" xmlns:a14="http://schemas.microsoft.com/office/drawing/2010/main" w="9525">
+                <a14:hiddenLine xmlns:a14="http://schemas.microsoft.com/office/drawing/2010/main" xmlns="" w="9525">
                   <a:solidFill>
                     <a:srgbClr val="000000"/>
                   </a:solidFill>
@@ -4711,7 +4712,7 @@
             </a:ln>
             <a:extLst>
               <a:ext uri="{91240B29-F687-4f45-9708-019B960494DF}">
-                <a14:hiddenLine xmlns="" xmlns:a14="http://schemas.microsoft.com/office/drawing/2010/main" w="9525">
+                <a14:hiddenLine xmlns:a14="http://schemas.microsoft.com/office/drawing/2010/main" xmlns="" w="9525">
                   <a:solidFill>
                     <a:srgbClr val="000000"/>
                   </a:solidFill>
@@ -4773,7 +4774,7 @@
             </a:ln>
             <a:extLst>
               <a:ext uri="{91240B29-F687-4f45-9708-019B960494DF}">
-                <a14:hiddenLine xmlns="" xmlns:a14="http://schemas.microsoft.com/office/drawing/2010/main" w="9525">
+                <a14:hiddenLine xmlns:a14="http://schemas.microsoft.com/office/drawing/2010/main" xmlns="" w="9525">
                   <a:solidFill>
                     <a:srgbClr val="000000"/>
                   </a:solidFill>
@@ -4863,7 +4864,7 @@
             </a:ln>
             <a:extLst>
               <a:ext uri="{91240B29-F687-4f45-9708-019B960494DF}">
-                <a14:hiddenLine xmlns="" xmlns:a14="http://schemas.microsoft.com/office/drawing/2010/main" w="9525">
+                <a14:hiddenLine xmlns:a14="http://schemas.microsoft.com/office/drawing/2010/main" xmlns="" w="9525">
                   <a:solidFill>
                     <a:srgbClr val="000000"/>
                   </a:solidFill>
@@ -4953,7 +4954,7 @@
             </a:ln>
             <a:extLst>
               <a:ext uri="{91240B29-F687-4f45-9708-019B960494DF}">
-                <a14:hiddenLine xmlns="" xmlns:a14="http://schemas.microsoft.com/office/drawing/2010/main" w="9525">
+                <a14:hiddenLine xmlns:a14="http://schemas.microsoft.com/office/drawing/2010/main" xmlns="" w="9525">
                   <a:solidFill>
                     <a:srgbClr val="000000"/>
                   </a:solidFill>
@@ -5018,7 +5019,7 @@
             </a:ln>
             <a:extLst>
               <a:ext uri="{91240B29-F687-4f45-9708-019B960494DF}">
-                <a14:hiddenLine xmlns="" xmlns:a14="http://schemas.microsoft.com/office/drawing/2010/main" w="9525">
+                <a14:hiddenLine xmlns:a14="http://schemas.microsoft.com/office/drawing/2010/main" xmlns="" w="9525">
                   <a:solidFill>
                     <a:srgbClr val="000000"/>
                   </a:solidFill>
@@ -5080,7 +5081,7 @@
             </a:ln>
             <a:extLst>
               <a:ext uri="{91240B29-F687-4f45-9708-019B960494DF}">
-                <a14:hiddenLine xmlns="" xmlns:a14="http://schemas.microsoft.com/office/drawing/2010/main" w="9525">
+                <a14:hiddenLine xmlns:a14="http://schemas.microsoft.com/office/drawing/2010/main" xmlns="" w="9525">
                   <a:solidFill>
                     <a:srgbClr val="000000"/>
                   </a:solidFill>
@@ -5170,7 +5171,7 @@
             </a:ln>
             <a:extLst>
               <a:ext uri="{91240B29-F687-4f45-9708-019B960494DF}">
-                <a14:hiddenLine xmlns="" xmlns:a14="http://schemas.microsoft.com/office/drawing/2010/main" w="9525">
+                <a14:hiddenLine xmlns:a14="http://schemas.microsoft.com/office/drawing/2010/main" xmlns="" w="9525">
                   <a:solidFill>
                     <a:srgbClr val="000000"/>
                   </a:solidFill>
@@ -5260,7 +5261,7 @@
             </a:ln>
             <a:extLst>
               <a:ext uri="{91240B29-F687-4f45-9708-019B960494DF}">
-                <a14:hiddenLine xmlns="" xmlns:a14="http://schemas.microsoft.com/office/drawing/2010/main" w="9525">
+                <a14:hiddenLine xmlns:a14="http://schemas.microsoft.com/office/drawing/2010/main" xmlns="" w="9525">
                   <a:solidFill>
                     <a:srgbClr val="000000"/>
                   </a:solidFill>
@@ -5322,7 +5323,7 @@
             </a:ln>
             <a:extLst>
               <a:ext uri="{91240B29-F687-4f45-9708-019B960494DF}">
-                <a14:hiddenLine xmlns="" xmlns:a14="http://schemas.microsoft.com/office/drawing/2010/main" w="9525">
+                <a14:hiddenLine xmlns:a14="http://schemas.microsoft.com/office/drawing/2010/main" xmlns="" w="9525">
                   <a:solidFill>
                     <a:srgbClr val="000000"/>
                   </a:solidFill>
@@ -5442,7 +5443,7 @@
             </a:ln>
             <a:extLst>
               <a:ext uri="{91240B29-F687-4f45-9708-019B960494DF}">
-                <a14:hiddenLine xmlns="" xmlns:a14="http://schemas.microsoft.com/office/drawing/2010/main" w="9525">
+                <a14:hiddenLine xmlns:a14="http://schemas.microsoft.com/office/drawing/2010/main" xmlns="" w="9525">
                   <a:solidFill>
                     <a:srgbClr val="000000"/>
                   </a:solidFill>
@@ -5510,7 +5511,7 @@
             </a:ln>
             <a:extLst>
               <a:ext uri="{91240B29-F687-4f45-9708-019B960494DF}">
-                <a14:hiddenLine xmlns="" xmlns:a14="http://schemas.microsoft.com/office/drawing/2010/main" w="9525">
+                <a14:hiddenLine xmlns:a14="http://schemas.microsoft.com/office/drawing/2010/main" xmlns="" w="9525">
                   <a:solidFill>
                     <a:srgbClr val="000000"/>
                   </a:solidFill>
@@ -5600,7 +5601,7 @@
             </a:ln>
             <a:extLst>
               <a:ext uri="{91240B29-F687-4f45-9708-019B960494DF}">
-                <a14:hiddenLine xmlns="" xmlns:a14="http://schemas.microsoft.com/office/drawing/2010/main" w="9525">
+                <a14:hiddenLine xmlns:a14="http://schemas.microsoft.com/office/drawing/2010/main" xmlns="" w="9525">
                   <a:solidFill>
                     <a:srgbClr val="000000"/>
                   </a:solidFill>
@@ -5740,7 +5741,7 @@
           <a:p>
             <a:fld id="{48A87A34-81AB-432B-8DAE-1953F412C126}" type="datetimeFigureOut">
               <a:rPr lang="en-US" dirty="0"/>
-              <a:t>1/15/2018</a:t>
+              <a:t>1/17/2018</a:t>
             </a:fld>
             <a:endParaRPr lang="en-US" dirty="0"/>
           </a:p>
@@ -6002,7 +6003,7 @@
           <a:p>
             <a:fld id="{48A87A34-81AB-432B-8DAE-1953F412C126}" type="datetimeFigureOut">
               <a:rPr lang="en-US" dirty="0"/>
-              <a:t>1/15/2018</a:t>
+              <a:t>1/17/2018</a:t>
             </a:fld>
             <a:endParaRPr lang="en-US" dirty="0"/>
           </a:p>
@@ -6193,7 +6194,7 @@
           <a:p>
             <a:fld id="{48A87A34-81AB-432B-8DAE-1953F412C126}" type="datetimeFigureOut">
               <a:rPr lang="en-US" dirty="0"/>
-              <a:t>1/15/2018</a:t>
+              <a:t>1/17/2018</a:t>
             </a:fld>
             <a:endParaRPr lang="en-US" dirty="0"/>
           </a:p>
@@ -6451,7 +6452,7 @@
           <a:p>
             <a:fld id="{48A87A34-81AB-432B-8DAE-1953F412C126}" type="datetimeFigureOut">
               <a:rPr lang="en-US" dirty="0"/>
-              <a:t>1/15/2018</a:t>
+              <a:t>1/17/2018</a:t>
             </a:fld>
             <a:endParaRPr lang="en-US" dirty="0"/>
           </a:p>
@@ -6880,7 +6881,7 @@
           <a:p>
             <a:fld id="{48A87A34-81AB-432B-8DAE-1953F412C126}" type="datetimeFigureOut">
               <a:rPr lang="en-US" dirty="0"/>
-              <a:t>1/15/2018</a:t>
+              <a:t>1/17/2018</a:t>
             </a:fld>
             <a:endParaRPr lang="en-US" dirty="0"/>
           </a:p>
@@ -7421,7 +7422,7 @@
           <a:p>
             <a:fld id="{48A87A34-81AB-432B-8DAE-1953F412C126}" type="datetimeFigureOut">
               <a:rPr lang="en-US" dirty="0"/>
-              <a:t>1/15/2018</a:t>
+              <a:t>1/17/2018</a:t>
             </a:fld>
             <a:endParaRPr lang="en-US" dirty="0"/>
           </a:p>
@@ -8136,7 +8137,7 @@
           <a:p>
             <a:fld id="{48A87A34-81AB-432B-8DAE-1953F412C126}" type="datetimeFigureOut">
               <a:rPr lang="en-US" dirty="0"/>
-              <a:t>1/15/2018</a:t>
+              <a:t>1/17/2018</a:t>
             </a:fld>
             <a:endParaRPr lang="en-US" dirty="0"/>
           </a:p>
@@ -8301,7 +8302,7 @@
           <a:p>
             <a:fld id="{48A87A34-81AB-432B-8DAE-1953F412C126}" type="datetimeFigureOut">
               <a:rPr lang="en-US" dirty="0"/>
-              <a:t>1/15/2018</a:t>
+              <a:t>1/17/2018</a:t>
             </a:fld>
             <a:endParaRPr lang="en-US" dirty="0"/>
           </a:p>
@@ -8476,7 +8477,7 @@
           <a:p>
             <a:fld id="{48A87A34-81AB-432B-8DAE-1953F412C126}" type="datetimeFigureOut">
               <a:rPr lang="en-US" dirty="0"/>
-              <a:t>1/15/2018</a:t>
+              <a:t>1/17/2018</a:t>
             </a:fld>
             <a:endParaRPr lang="en-US" dirty="0"/>
           </a:p>
@@ -8641,7 +8642,7 @@
           <a:p>
             <a:fld id="{48A87A34-81AB-432B-8DAE-1953F412C126}" type="datetimeFigureOut">
               <a:rPr lang="en-US" dirty="0"/>
-              <a:t>1/15/2018</a:t>
+              <a:t>1/17/2018</a:t>
             </a:fld>
             <a:endParaRPr lang="en-US" dirty="0"/>
           </a:p>
@@ -8886,7 +8887,7 @@
           <a:p>
             <a:fld id="{48A87A34-81AB-432B-8DAE-1953F412C126}" type="datetimeFigureOut">
               <a:rPr lang="en-US" dirty="0"/>
-              <a:t>1/15/2018</a:t>
+              <a:t>1/17/2018</a:t>
             </a:fld>
             <a:endParaRPr lang="en-US" dirty="0"/>
           </a:p>
@@ -9113,7 +9114,7 @@
           <a:p>
             <a:fld id="{48A87A34-81AB-432B-8DAE-1953F412C126}" type="datetimeFigureOut">
               <a:rPr lang="en-US" dirty="0"/>
-              <a:t>1/15/2018</a:t>
+              <a:t>1/17/2018</a:t>
             </a:fld>
             <a:endParaRPr lang="en-US" dirty="0"/>
           </a:p>
@@ -9489,7 +9490,7 @@
           <a:p>
             <a:fld id="{48A87A34-81AB-432B-8DAE-1953F412C126}" type="datetimeFigureOut">
               <a:rPr lang="en-US" dirty="0"/>
-              <a:t>1/15/2018</a:t>
+              <a:t>1/17/2018</a:t>
             </a:fld>
             <a:endParaRPr lang="en-US" dirty="0"/>
           </a:p>
@@ -9602,7 +9603,7 @@
           <a:p>
             <a:fld id="{48A87A34-81AB-432B-8DAE-1953F412C126}" type="datetimeFigureOut">
               <a:rPr lang="en-US" dirty="0"/>
-              <a:t>1/15/2018</a:t>
+              <a:t>1/17/2018</a:t>
             </a:fld>
             <a:endParaRPr lang="en-US" dirty="0"/>
           </a:p>
@@ -9692,7 +9693,7 @@
           <a:p>
             <a:fld id="{48A87A34-81AB-432B-8DAE-1953F412C126}" type="datetimeFigureOut">
               <a:rPr lang="en-US" dirty="0"/>
-              <a:t>1/15/2018</a:t>
+              <a:t>1/17/2018</a:t>
             </a:fld>
             <a:endParaRPr lang="en-US" dirty="0"/>
           </a:p>
@@ -9936,7 +9937,7 @@
           <a:p>
             <a:fld id="{48A87A34-81AB-432B-8DAE-1953F412C126}" type="datetimeFigureOut">
               <a:rPr lang="en-US" dirty="0"/>
-              <a:t>1/15/2018</a:t>
+              <a:t>1/17/2018</a:t>
             </a:fld>
             <a:endParaRPr lang="en-US" dirty="0"/>
           </a:p>
@@ -10211,7 +10212,7 @@
           <a:p>
             <a:fld id="{48A87A34-81AB-432B-8DAE-1953F412C126}" type="datetimeFigureOut">
               <a:rPr lang="en-US" dirty="0"/>
-              <a:t>1/15/2018</a:t>
+              <a:t>1/17/2018</a:t>
             </a:fld>
             <a:endParaRPr lang="en-US" dirty="0"/>
           </a:p>
@@ -10322,7 +10323,7 @@
           <a:noFill/>
           <a:extLst>
             <a:ext uri="{909E8E84-426E-40dd-AFC4-6F175D3DCCD1}">
-              <a14:hiddenFill xmlns="" xmlns:a14="http://schemas.microsoft.com/office/drawing/2010/main">
+              <a14:hiddenFill xmlns:a14="http://schemas.microsoft.com/office/drawing/2010/main" xmlns="">
                 <a:solidFill>
                   <a:srgbClr val="FFFFFF"/>
                 </a:solidFill>
@@ -10396,7 +10397,7 @@
               </a:ln>
               <a:extLst>
                 <a:ext uri="{91240B29-F687-4f45-9708-019B960494DF}">
-                  <a14:hiddenLine xmlns="" xmlns:a14="http://schemas.microsoft.com/office/drawing/2010/main" w="9525">
+                  <a14:hiddenLine xmlns:a14="http://schemas.microsoft.com/office/drawing/2010/main" xmlns="" w="9525">
                     <a:solidFill>
                       <a:srgbClr val="000000"/>
                     </a:solidFill>
@@ -10486,7 +10487,7 @@
               </a:ln>
               <a:extLst>
                 <a:ext uri="{91240B29-F687-4f45-9708-019B960494DF}">
-                  <a14:hiddenLine xmlns="" xmlns:a14="http://schemas.microsoft.com/office/drawing/2010/main" w="9525">
+                  <a14:hiddenLine xmlns:a14="http://schemas.microsoft.com/office/drawing/2010/main" xmlns="" w="9525">
                     <a:solidFill>
                       <a:srgbClr val="000000"/>
                     </a:solidFill>
@@ -10576,7 +10577,7 @@
               </a:ln>
               <a:extLst>
                 <a:ext uri="{91240B29-F687-4f45-9708-019B960494DF}">
-                  <a14:hiddenLine xmlns="" xmlns:a14="http://schemas.microsoft.com/office/drawing/2010/main" w="9525">
+                  <a14:hiddenLine xmlns:a14="http://schemas.microsoft.com/office/drawing/2010/main" xmlns="" w="9525">
                     <a:solidFill>
                       <a:srgbClr val="000000"/>
                     </a:solidFill>
@@ -10638,7 +10639,7 @@
               </a:ln>
               <a:extLst>
                 <a:ext uri="{91240B29-F687-4f45-9708-019B960494DF}">
-                  <a14:hiddenLine xmlns="" xmlns:a14="http://schemas.microsoft.com/office/drawing/2010/main" w="9525">
+                  <a14:hiddenLine xmlns:a14="http://schemas.microsoft.com/office/drawing/2010/main" xmlns="" w="9525">
                     <a:solidFill>
                       <a:srgbClr val="000000"/>
                     </a:solidFill>
@@ -10728,7 +10729,7 @@
               </a:ln>
               <a:extLst>
                 <a:ext uri="{91240B29-F687-4f45-9708-019B960494DF}">
-                  <a14:hiddenLine xmlns="" xmlns:a14="http://schemas.microsoft.com/office/drawing/2010/main" w="9525">
+                  <a14:hiddenLine xmlns:a14="http://schemas.microsoft.com/office/drawing/2010/main" xmlns="" w="9525">
                     <a:solidFill>
                       <a:srgbClr val="000000"/>
                     </a:solidFill>
@@ -10790,7 +10791,7 @@
               </a:ln>
               <a:extLst>
                 <a:ext uri="{91240B29-F687-4f45-9708-019B960494DF}">
-                  <a14:hiddenLine xmlns="" xmlns:a14="http://schemas.microsoft.com/office/drawing/2010/main" w="9525">
+                  <a14:hiddenLine xmlns:a14="http://schemas.microsoft.com/office/drawing/2010/main" xmlns="" w="9525">
                     <a:solidFill>
                       <a:srgbClr val="000000"/>
                     </a:solidFill>
@@ -10852,7 +10853,7 @@
               </a:ln>
               <a:extLst>
                 <a:ext uri="{91240B29-F687-4f45-9708-019B960494DF}">
-                  <a14:hiddenLine xmlns="" xmlns:a14="http://schemas.microsoft.com/office/drawing/2010/main" w="9525">
+                  <a14:hiddenLine xmlns:a14="http://schemas.microsoft.com/office/drawing/2010/main" xmlns="" w="9525">
                     <a:solidFill>
                       <a:srgbClr val="000000"/>
                     </a:solidFill>
@@ -10942,7 +10943,7 @@
               </a:ln>
               <a:extLst>
                 <a:ext uri="{91240B29-F687-4f45-9708-019B960494DF}">
-                  <a14:hiddenLine xmlns="" xmlns:a14="http://schemas.microsoft.com/office/drawing/2010/main" w="9525">
+                  <a14:hiddenLine xmlns:a14="http://schemas.microsoft.com/office/drawing/2010/main" xmlns="" w="9525">
                     <a:solidFill>
                       <a:srgbClr val="000000"/>
                     </a:solidFill>
@@ -11032,7 +11033,7 @@
               </a:ln>
               <a:extLst>
                 <a:ext uri="{91240B29-F687-4f45-9708-019B960494DF}">
-                  <a14:hiddenLine xmlns="" xmlns:a14="http://schemas.microsoft.com/office/drawing/2010/main" w="9525">
+                  <a14:hiddenLine xmlns:a14="http://schemas.microsoft.com/office/drawing/2010/main" xmlns="" w="9525">
                     <a:solidFill>
                       <a:srgbClr val="000000"/>
                     </a:solidFill>
@@ -11094,7 +11095,7 @@
               </a:ln>
               <a:extLst>
                 <a:ext uri="{91240B29-F687-4f45-9708-019B960494DF}">
-                  <a14:hiddenLine xmlns="" xmlns:a14="http://schemas.microsoft.com/office/drawing/2010/main" w="9525">
+                  <a14:hiddenLine xmlns:a14="http://schemas.microsoft.com/office/drawing/2010/main" xmlns="" w="9525">
                     <a:solidFill>
                       <a:srgbClr val="000000"/>
                     </a:solidFill>
@@ -11204,7 +11205,7 @@
               </a:ln>
               <a:extLst>
                 <a:ext uri="{91240B29-F687-4f45-9708-019B960494DF}">
-                  <a14:hiddenLine xmlns="" xmlns:a14="http://schemas.microsoft.com/office/drawing/2010/main" w="9525">
+                  <a14:hiddenLine xmlns:a14="http://schemas.microsoft.com/office/drawing/2010/main" xmlns="" w="9525">
                     <a:solidFill>
                       <a:srgbClr val="000000"/>
                     </a:solidFill>
@@ -11288,7 +11289,7 @@
               </a:ln>
               <a:extLst>
                 <a:ext uri="{91240B29-F687-4f45-9708-019B960494DF}">
-                  <a14:hiddenLine xmlns="" xmlns:a14="http://schemas.microsoft.com/office/drawing/2010/main" w="9525">
+                  <a14:hiddenLine xmlns:a14="http://schemas.microsoft.com/office/drawing/2010/main" xmlns="" w="9525">
                     <a:solidFill>
                       <a:srgbClr val="000000"/>
                     </a:solidFill>
@@ -11350,7 +11351,7 @@
               </a:ln>
               <a:extLst>
                 <a:ext uri="{91240B29-F687-4f45-9708-019B960494DF}">
-                  <a14:hiddenLine xmlns="" xmlns:a14="http://schemas.microsoft.com/office/drawing/2010/main" w="9525">
+                  <a14:hiddenLine xmlns:a14="http://schemas.microsoft.com/office/drawing/2010/main" xmlns="" w="9525">
                     <a:solidFill>
                       <a:srgbClr val="000000"/>
                     </a:solidFill>
@@ -11412,7 +11413,7 @@
               </a:ln>
               <a:extLst>
                 <a:ext uri="{91240B29-F687-4f45-9708-019B960494DF}">
-                  <a14:hiddenLine xmlns="" xmlns:a14="http://schemas.microsoft.com/office/drawing/2010/main" w="9525">
+                  <a14:hiddenLine xmlns:a14="http://schemas.microsoft.com/office/drawing/2010/main" xmlns="" w="9525">
                     <a:solidFill>
                       <a:srgbClr val="000000"/>
                     </a:solidFill>
@@ -11502,7 +11503,7 @@
               </a:ln>
               <a:extLst>
                 <a:ext uri="{91240B29-F687-4f45-9708-019B960494DF}">
-                  <a14:hiddenLine xmlns="" xmlns:a14="http://schemas.microsoft.com/office/drawing/2010/main" w="9525">
+                  <a14:hiddenLine xmlns:a14="http://schemas.microsoft.com/office/drawing/2010/main" xmlns="" w="9525">
                     <a:solidFill>
                       <a:srgbClr val="000000"/>
                     </a:solidFill>
@@ -11536,7 +11537,7 @@
               </a:ln>
               <a:extLst>
                 <a:ext uri="{91240B29-F687-4f45-9708-019B960494DF}">
-                  <a14:hiddenLine xmlns="" xmlns:a14="http://schemas.microsoft.com/office/drawing/2010/main" w="9525">
+                  <a14:hiddenLine xmlns:a14="http://schemas.microsoft.com/office/drawing/2010/main" xmlns="" w="9525">
                     <a:solidFill>
                       <a:srgbClr val="000000"/>
                     </a:solidFill>
@@ -11601,7 +11602,7 @@
               </a:ln>
               <a:extLst>
                 <a:ext uri="{91240B29-F687-4f45-9708-019B960494DF}">
-                  <a14:hiddenLine xmlns="" xmlns:a14="http://schemas.microsoft.com/office/drawing/2010/main" w="9525">
+                  <a14:hiddenLine xmlns:a14="http://schemas.microsoft.com/office/drawing/2010/main" xmlns="" w="9525">
                     <a:solidFill>
                       <a:srgbClr val="000000"/>
                     </a:solidFill>
@@ -11691,7 +11692,7 @@
               </a:ln>
               <a:extLst>
                 <a:ext uri="{91240B29-F687-4f45-9708-019B960494DF}">
-                  <a14:hiddenLine xmlns="" xmlns:a14="http://schemas.microsoft.com/office/drawing/2010/main" w="9525">
+                  <a14:hiddenLine xmlns:a14="http://schemas.microsoft.com/office/drawing/2010/main" xmlns="" w="9525">
                     <a:solidFill>
                       <a:srgbClr val="000000"/>
                     </a:solidFill>
@@ -11753,7 +11754,7 @@
               </a:ln>
               <a:extLst>
                 <a:ext uri="{91240B29-F687-4f45-9708-019B960494DF}">
-                  <a14:hiddenLine xmlns="" xmlns:a14="http://schemas.microsoft.com/office/drawing/2010/main" w="9525">
+                  <a14:hiddenLine xmlns:a14="http://schemas.microsoft.com/office/drawing/2010/main" xmlns="" w="9525">
                     <a:solidFill>
                       <a:srgbClr val="000000"/>
                     </a:solidFill>
@@ -11843,7 +11844,7 @@
               </a:ln>
               <a:extLst>
                 <a:ext uri="{91240B29-F687-4f45-9708-019B960494DF}">
-                  <a14:hiddenLine xmlns="" xmlns:a14="http://schemas.microsoft.com/office/drawing/2010/main" w="9525">
+                  <a14:hiddenLine xmlns:a14="http://schemas.microsoft.com/office/drawing/2010/main" xmlns="" w="9525">
                     <a:solidFill>
                       <a:srgbClr val="000000"/>
                     </a:solidFill>
@@ -11908,7 +11909,7 @@
               </a:ln>
               <a:extLst>
                 <a:ext uri="{91240B29-F687-4f45-9708-019B960494DF}">
-                  <a14:hiddenLine xmlns="" xmlns:a14="http://schemas.microsoft.com/office/drawing/2010/main" w="9525">
+                  <a14:hiddenLine xmlns:a14="http://schemas.microsoft.com/office/drawing/2010/main" xmlns="" w="9525">
                     <a:solidFill>
                       <a:srgbClr val="000000"/>
                     </a:solidFill>
@@ -11970,7 +11971,7 @@
               </a:ln>
               <a:extLst>
                 <a:ext uri="{91240B29-F687-4f45-9708-019B960494DF}">
-                  <a14:hiddenLine xmlns="" xmlns:a14="http://schemas.microsoft.com/office/drawing/2010/main" w="9525">
+                  <a14:hiddenLine xmlns:a14="http://schemas.microsoft.com/office/drawing/2010/main" xmlns="" w="9525">
                     <a:solidFill>
                       <a:srgbClr val="000000"/>
                     </a:solidFill>
@@ -12060,7 +12061,7 @@
               </a:ln>
               <a:extLst>
                 <a:ext uri="{91240B29-F687-4f45-9708-019B960494DF}">
-                  <a14:hiddenLine xmlns="" xmlns:a14="http://schemas.microsoft.com/office/drawing/2010/main" w="9525">
+                  <a14:hiddenLine xmlns:a14="http://schemas.microsoft.com/office/drawing/2010/main" xmlns="" w="9525">
                     <a:solidFill>
                       <a:srgbClr val="000000"/>
                     </a:solidFill>
@@ -12150,7 +12151,7 @@
               </a:ln>
               <a:extLst>
                 <a:ext uri="{91240B29-F687-4f45-9708-019B960494DF}">
-                  <a14:hiddenLine xmlns="" xmlns:a14="http://schemas.microsoft.com/office/drawing/2010/main" w="9525">
+                  <a14:hiddenLine xmlns:a14="http://schemas.microsoft.com/office/drawing/2010/main" xmlns="" w="9525">
                     <a:solidFill>
                       <a:srgbClr val="000000"/>
                     </a:solidFill>
@@ -12215,7 +12216,7 @@
               </a:ln>
               <a:extLst>
                 <a:ext uri="{91240B29-F687-4f45-9708-019B960494DF}">
-                  <a14:hiddenLine xmlns="" xmlns:a14="http://schemas.microsoft.com/office/drawing/2010/main" w="9525">
+                  <a14:hiddenLine xmlns:a14="http://schemas.microsoft.com/office/drawing/2010/main" xmlns="" w="9525">
                     <a:solidFill>
                       <a:srgbClr val="000000"/>
                     </a:solidFill>
@@ -12335,7 +12336,7 @@
               </a:ln>
               <a:extLst>
                 <a:ext uri="{91240B29-F687-4f45-9708-019B960494DF}">
-                  <a14:hiddenLine xmlns="" xmlns:a14="http://schemas.microsoft.com/office/drawing/2010/main" w="9525">
+                  <a14:hiddenLine xmlns:a14="http://schemas.microsoft.com/office/drawing/2010/main" xmlns="" w="9525">
                     <a:solidFill>
                       <a:srgbClr val="000000"/>
                     </a:solidFill>
@@ -12433,7 +12434,7 @@
               </a:ln>
               <a:extLst>
                 <a:ext uri="{91240B29-F687-4f45-9708-019B960494DF}">
-                  <a14:hiddenLine xmlns="" xmlns:a14="http://schemas.microsoft.com/office/drawing/2010/main" w="9525">
+                  <a14:hiddenLine xmlns:a14="http://schemas.microsoft.com/office/drawing/2010/main" xmlns="" w="9525">
                     <a:solidFill>
                       <a:srgbClr val="000000"/>
                     </a:solidFill>
@@ -12548,7 +12549,7 @@
               </a:ln>
               <a:extLst>
                 <a:ext uri="{91240B29-F687-4f45-9708-019B960494DF}">
-                  <a14:hiddenLine xmlns="" xmlns:a14="http://schemas.microsoft.com/office/drawing/2010/main" w="9525">
+                  <a14:hiddenLine xmlns:a14="http://schemas.microsoft.com/office/drawing/2010/main" xmlns="" w="9525">
                     <a:solidFill>
                       <a:srgbClr val="000000"/>
                     </a:solidFill>
@@ -12638,7 +12639,7 @@
               </a:ln>
               <a:extLst>
                 <a:ext uri="{91240B29-F687-4f45-9708-019B960494DF}">
-                  <a14:hiddenLine xmlns="" xmlns:a14="http://schemas.microsoft.com/office/drawing/2010/main" w="9525">
+                  <a14:hiddenLine xmlns:a14="http://schemas.microsoft.com/office/drawing/2010/main" xmlns="" w="9525">
                     <a:solidFill>
                       <a:srgbClr val="000000"/>
                     </a:solidFill>
@@ -12703,7 +12704,7 @@
               </a:ln>
               <a:extLst>
                 <a:ext uri="{91240B29-F687-4f45-9708-019B960494DF}">
-                  <a14:hiddenLine xmlns="" xmlns:a14="http://schemas.microsoft.com/office/drawing/2010/main" w="9525">
+                  <a14:hiddenLine xmlns:a14="http://schemas.microsoft.com/office/drawing/2010/main" xmlns="" w="9525">
                     <a:solidFill>
                       <a:srgbClr val="000000"/>
                     </a:solidFill>
@@ -12793,7 +12794,7 @@
               </a:ln>
               <a:extLst>
                 <a:ext uri="{91240B29-F687-4f45-9708-019B960494DF}">
-                  <a14:hiddenLine xmlns="" xmlns:a14="http://schemas.microsoft.com/office/drawing/2010/main" w="9525">
+                  <a14:hiddenLine xmlns:a14="http://schemas.microsoft.com/office/drawing/2010/main" xmlns="" w="9525">
                     <a:solidFill>
                       <a:srgbClr val="000000"/>
                     </a:solidFill>
@@ -12861,7 +12862,7 @@
               </a:ln>
               <a:extLst>
                 <a:ext uri="{91240B29-F687-4f45-9708-019B960494DF}">
-                  <a14:hiddenLine xmlns="" xmlns:a14="http://schemas.microsoft.com/office/drawing/2010/main" w="9525">
+                  <a14:hiddenLine xmlns:a14="http://schemas.microsoft.com/office/drawing/2010/main" xmlns="" w="9525">
                     <a:solidFill>
                       <a:srgbClr val="000000"/>
                     </a:solidFill>
@@ -12951,7 +12952,7 @@
               </a:ln>
               <a:extLst>
                 <a:ext uri="{91240B29-F687-4f45-9708-019B960494DF}">
-                  <a14:hiddenLine xmlns="" xmlns:a14="http://schemas.microsoft.com/office/drawing/2010/main" w="9525">
+                  <a14:hiddenLine xmlns:a14="http://schemas.microsoft.com/office/drawing/2010/main" xmlns="" w="9525">
                     <a:solidFill>
                       <a:srgbClr val="000000"/>
                     </a:solidFill>
@@ -13019,7 +13020,7 @@
               </a:ln>
               <a:extLst>
                 <a:ext uri="{91240B29-F687-4f45-9708-019B960494DF}">
-                  <a14:hiddenLine xmlns="" xmlns:a14="http://schemas.microsoft.com/office/drawing/2010/main" w="9525">
+                  <a14:hiddenLine xmlns:a14="http://schemas.microsoft.com/office/drawing/2010/main" xmlns="" w="9525">
                     <a:solidFill>
                       <a:srgbClr val="000000"/>
                     </a:solidFill>
@@ -13109,7 +13110,7 @@
               </a:ln>
               <a:extLst>
                 <a:ext uri="{91240B29-F687-4f45-9708-019B960494DF}">
-                  <a14:hiddenLine xmlns="" xmlns:a14="http://schemas.microsoft.com/office/drawing/2010/main" w="9525">
+                  <a14:hiddenLine xmlns:a14="http://schemas.microsoft.com/office/drawing/2010/main" xmlns="" w="9525">
                     <a:solidFill>
                       <a:srgbClr val="000000"/>
                     </a:solidFill>
@@ -13143,7 +13144,7 @@
               </a:ln>
               <a:extLst>
                 <a:ext uri="{91240B29-F687-4f45-9708-019B960494DF}">
-                  <a14:hiddenLine xmlns="" xmlns:a14="http://schemas.microsoft.com/office/drawing/2010/main" w="9525">
+                  <a14:hiddenLine xmlns:a14="http://schemas.microsoft.com/office/drawing/2010/main" xmlns="" w="9525">
                     <a:solidFill>
                       <a:srgbClr val="000000"/>
                     </a:solidFill>
@@ -13284,7 +13285,7 @@
             <a:fld id="{48A87A34-81AB-432B-8DAE-1953F412C126}" type="datetimeFigureOut">
               <a:rPr lang="en-US" dirty="0"/>
               <a:pPr/>
-              <a:t>1/15/2018</a:t>
+              <a:t>1/17/2018</a:t>
             </a:fld>
             <a:endParaRPr lang="en-US" dirty="0"/>
           </a:p>
@@ -13925,13 +13926,8 @@
             <a:pPr lvl="1"/>
             <a:r>
               <a:rPr lang="en-US" dirty="0"/>
-              <a:t>This avoids optimizer getting stuck in its initial </a:t>
-            </a:r>
-            <a:r>
-              <a:rPr lang="en-US" dirty="0" err="1"/>
-              <a:t>powition</a:t>
-            </a:r>
-            <a:endParaRPr lang="en-US" dirty="0"/>
+              <a:t>This avoids optimizer getting stuck in its initial position</a:t>
+            </a:r>
           </a:p>
           <a:p>
             <a:r>
@@ -14065,6 +14061,16 @@
             <a:r>
               <a:rPr lang="en-US" dirty="0"/>
               <a:t> operates with an amount of inertia and can get past saddle points</a:t>
+            </a:r>
+          </a:p>
+          <a:p>
+            <a:r>
+              <a:rPr lang="en-US" dirty="0" err="1"/>
+              <a:t>AdamOptimizer</a:t>
+            </a:r>
+            <a:r>
+              <a:rPr lang="en-US" dirty="0"/>
+              <a:t> computes individual adaptive learning rates for different parameters</a:t>
             </a:r>
           </a:p>
           <a:p>
@@ -22614,7 +22620,7 @@
           <a:p>
             <a:r>
               <a:rPr lang="en-US" dirty="0"/>
-              <a:t>train </a:t>
+              <a:t>Create </a:t>
             </a:r>
             <a:r>
               <a:rPr lang="en-US" dirty="0" err="1"/>
@@ -22629,17 +22635,25 @@
             </a:br>
             <a:r>
               <a:rPr lang="en-US" sz="1600" dirty="0"/>
-              <a:t>create a session and arrange to save resultant model</a:t>
+              <a:t>arrange for </a:t>
+            </a:r>
+            <a:r>
+              <a:rPr lang="en-US" sz="1600" dirty="0" err="1"/>
+              <a:t>tensorboard</a:t>
+            </a:r>
+            <a:r>
+              <a:rPr lang="en-US" sz="1600" dirty="0"/>
+              <a:t> instrumentation</a:t>
             </a:r>
           </a:p>
         </p:txBody>
       </p:sp>
       <p:sp>
         <p:nvSpPr>
-          <p:cNvPr id="101" name="TextBox 100">
+          <p:cNvPr id="5" name="TextBox 4">
             <a:extLst>
               <a:ext uri="{FF2B5EF4-FFF2-40B4-BE49-F238E27FC236}">
-                <a16:creationId xmlns:a16="http://schemas.microsoft.com/office/drawing/2014/main" id="{7E5FA93A-E4F5-4DBF-90F7-C99F40568C42}"/>
+                <a16:creationId xmlns:a16="http://schemas.microsoft.com/office/drawing/2014/main" id="{D935BC27-AE9C-4CFD-BDC0-1B18DD0130D9}"/>
               </a:ext>
             </a:extLst>
           </p:cNvPr>
@@ -22648,8 +22662,8 @@
         </p:nvSpPr>
         <p:spPr>
           <a:xfrm>
-            <a:off x="1141412" y="2150364"/>
-            <a:ext cx="10266285" cy="3785652"/>
+            <a:off x="1129001" y="2095746"/>
+            <a:ext cx="8733456" cy="2800767"/>
           </a:xfrm>
           <a:prstGeom prst="rect">
             <a:avLst/>
@@ -22664,102 +22678,23 @@
           <a:p>
             <a:r>
               <a:rPr lang="en-US" sz="1600" dirty="0"/>
-              <a:t># we want to be able to save the results of our trained model</a:t>
-            </a:r>
-          </a:p>
-          <a:p>
-            <a:r>
-              <a:rPr lang="en-US" sz="1600" dirty="0" err="1"/>
-              <a:t>modelSaver</a:t>
-            </a:r>
-            <a:r>
-              <a:rPr lang="en-US" sz="1600" dirty="0"/>
-              <a:t> = </a:t>
-            </a:r>
-            <a:r>
-              <a:rPr lang="en-US" sz="1600" dirty="0" err="1"/>
-              <a:t>tf.train.Saver</a:t>
-            </a:r>
-            <a:r>
-              <a:rPr lang="en-US" sz="1600" dirty="0"/>
-              <a:t>()</a:t>
-            </a:r>
-          </a:p>
-          <a:p>
-            <a:endParaRPr lang="en-US" sz="1600" dirty="0"/>
-          </a:p>
-          <a:p>
-            <a:r>
-              <a:rPr lang="en-US" sz="1600" dirty="0"/>
-              <a:t># we need a session in which we can execute our model</a:t>
-            </a:r>
-          </a:p>
-          <a:p>
-            <a:r>
-              <a:rPr lang="en-US" sz="1600" dirty="0"/>
-              <a:t>session = </a:t>
-            </a:r>
-            <a:r>
-              <a:rPr lang="en-US" sz="1600" dirty="0" err="1"/>
-              <a:t>tf.InteractiveSession</a:t>
-            </a:r>
-            <a:r>
-              <a:rPr lang="en-US" sz="1600" dirty="0"/>
-              <a:t>()</a:t>
-            </a:r>
-          </a:p>
-          <a:p>
-            <a:endParaRPr lang="en-US" sz="1600" dirty="0"/>
-          </a:p>
-          <a:p>
-            <a:r>
-              <a:rPr lang="en-US" sz="1600" i="1" dirty="0">
-                <a:solidFill>
-                  <a:srgbClr val="FFFF00"/>
-                </a:solidFill>
-              </a:rPr>
-              <a:t>&lt; PERFORM MODEL TRAINING HERE&gt;</a:t>
-            </a:r>
-          </a:p>
-          <a:p>
-            <a:endParaRPr lang="en-US" sz="1600" dirty="0"/>
-          </a:p>
-          <a:p>
-            <a:r>
-              <a:rPr lang="en-US" sz="1600" dirty="0"/>
-              <a:t># save trained model to disk</a:t>
-            </a:r>
-          </a:p>
-          <a:p>
-            <a:r>
-              <a:rPr lang="en-US" sz="1600" dirty="0"/>
-              <a:t>directory = </a:t>
-            </a:r>
-            <a:r>
-              <a:rPr lang="en-US" sz="1600" i="1" dirty="0"/>
-              <a:t>"</a:t>
-            </a:r>
-            <a:r>
-              <a:rPr lang="en-US" sz="1600" i="1" dirty="0" err="1"/>
-              <a:t>modelExport</a:t>
-            </a:r>
-            <a:r>
-              <a:rPr lang="en-US" sz="1600" i="1" dirty="0"/>
-              <a:t>"</a:t>
-            </a:r>
-          </a:p>
-          <a:p>
-            <a:r>
-              <a:rPr lang="en-US" sz="1600" dirty="0"/>
-              <a:t>if not </a:t>
-            </a:r>
-            <a:r>
-              <a:rPr lang="en-US" sz="1600" dirty="0" err="1"/>
-              <a:t>os.path.exists</a:t>
-            </a:r>
-            <a:r>
-              <a:rPr lang="en-US" sz="1600" dirty="0"/>
-              <a:t>(directory):</a:t>
+              <a:t>def </a:t>
+            </a:r>
+            <a:r>
+              <a:rPr lang="en-US" sz="1600" b="1" dirty="0" err="1"/>
+              <a:t>tensorboardVariableSummaries</a:t>
+            </a:r>
+            <a:r>
+              <a:rPr lang="en-US" sz="1600" b="1" dirty="0"/>
+              <a:t>(</a:t>
+            </a:r>
+            <a:r>
+              <a:rPr lang="en-US" sz="1600" b="1" dirty="0" err="1"/>
+              <a:t>var</a:t>
+            </a:r>
+            <a:r>
+              <a:rPr lang="en-US" sz="1600" b="1" dirty="0"/>
+              <a:t>):</a:t>
             </a:r>
           </a:p>
           <a:p>
@@ -22768,63 +22703,271 @@
               <a:t>    </a:t>
             </a:r>
             <a:r>
+              <a:rPr lang="en-US" sz="1600" i="1" dirty="0"/>
+              <a:t>"""Attach a lot of summaries to a Tensor (for </a:t>
+            </a:r>
+            <a:r>
+              <a:rPr lang="en-US" sz="1600" i="1" dirty="0" err="1"/>
+              <a:t>TensorBoard</a:t>
+            </a:r>
+            <a:r>
+              <a:rPr lang="en-US" sz="1600" i="1" dirty="0"/>
+              <a:t> visualization)."""</a:t>
+            </a:r>
+          </a:p>
+          <a:p>
+            <a:r>
+              <a:rPr lang="en-US" sz="1600" dirty="0"/>
+              <a:t>    with </a:t>
+            </a:r>
+            <a:r>
               <a:rPr lang="en-US" sz="1600" dirty="0" err="1"/>
-              <a:t>os.makedirs</a:t>
+              <a:t>tf.name_scope</a:t>
             </a:r>
             <a:r>
               <a:rPr lang="en-US" sz="1600" dirty="0"/>
-              <a:t>(directory)</a:t>
-            </a:r>
-          </a:p>
-          <a:p>
+              <a:t>(</a:t>
+            </a:r>
+            <a:r>
+              <a:rPr lang="en-US" sz="1600" i="1" dirty="0"/>
+              <a:t>'summaries'):</a:t>
+            </a:r>
+          </a:p>
+          <a:p>
+            <a:r>
+              <a:rPr lang="en-US" sz="1600" dirty="0"/>
+              <a:t>        mean = </a:t>
+            </a:r>
             <a:r>
               <a:rPr lang="en-US" sz="1600" dirty="0" err="1"/>
-              <a:t>modelSaver.save</a:t>
+              <a:t>tf.reduce_mean</a:t>
             </a:r>
             <a:r>
               <a:rPr lang="en-US" sz="1600" dirty="0"/>
-              <a:t>(session, </a:t>
+              <a:t>(</a:t>
+            </a:r>
+            <a:r>
+              <a:rPr lang="en-US" sz="1600" dirty="0" err="1"/>
+              <a:t>var</a:t>
+            </a:r>
+            <a:r>
+              <a:rPr lang="en-US" sz="1600" dirty="0"/>
+              <a:t>)</a:t>
+            </a:r>
+          </a:p>
+          <a:p>
+            <a:r>
+              <a:rPr lang="en-US" sz="1600" dirty="0"/>
+              <a:t>        </a:t>
+            </a:r>
+            <a:r>
+              <a:rPr lang="en-US" sz="1600" dirty="0" err="1"/>
+              <a:t>tf.summary.scalar</a:t>
+            </a:r>
+            <a:r>
+              <a:rPr lang="en-US" sz="1600" dirty="0"/>
+              <a:t>(</a:t>
             </a:r>
             <a:r>
               <a:rPr lang="en-US" sz="1600" i="1" dirty="0"/>
-              <a:t>'</a:t>
+              <a:t>'mean', mean)</a:t>
+            </a:r>
+          </a:p>
+          <a:p>
+            <a:r>
+              <a:rPr lang="en-US" sz="1600" dirty="0"/>
+              <a:t>    #    with </a:t>
+            </a:r>
+            <a:r>
+              <a:rPr lang="en-US" sz="1600" dirty="0" err="1"/>
+              <a:t>tf.name_scope</a:t>
+            </a:r>
+            <a:r>
+              <a:rPr lang="en-US" sz="1600" dirty="0"/>
+              <a:t>('</a:t>
+            </a:r>
+            <a:r>
+              <a:rPr lang="en-US" sz="1600" u="sng" dirty="0" err="1"/>
+              <a:t>stddev</a:t>
+            </a:r>
+            <a:r>
+              <a:rPr lang="en-US" sz="1600" u="sng" dirty="0"/>
+              <a:t>'):</a:t>
+            </a:r>
+          </a:p>
+          <a:p>
+            <a:r>
+              <a:rPr lang="en-US" sz="1600" dirty="0"/>
+              <a:t>    #        </a:t>
+            </a:r>
+            <a:r>
+              <a:rPr lang="en-US" sz="1600" u="sng" dirty="0" err="1"/>
+              <a:t>stddev</a:t>
+            </a:r>
+            <a:r>
+              <a:rPr lang="en-US" sz="1600" u="sng" dirty="0"/>
+              <a:t> = </a:t>
+            </a:r>
+            <a:r>
+              <a:rPr lang="en-US" sz="1600" u="sng" dirty="0" err="1"/>
+              <a:t>tf.sqrt</a:t>
+            </a:r>
+            <a:r>
+              <a:rPr lang="en-US" sz="1600" u="sng" dirty="0"/>
+              <a:t>(</a:t>
+            </a:r>
+            <a:r>
+              <a:rPr lang="en-US" sz="1600" u="sng" dirty="0" err="1"/>
+              <a:t>tf.reduce_mean</a:t>
+            </a:r>
+            <a:r>
+              <a:rPr lang="en-US" sz="1600" u="sng" dirty="0"/>
+              <a:t>(</a:t>
+            </a:r>
+            <a:r>
+              <a:rPr lang="en-US" sz="1600" u="sng" dirty="0" err="1"/>
+              <a:t>tf.square</a:t>
+            </a:r>
+            <a:r>
+              <a:rPr lang="en-US" sz="1600" u="sng" dirty="0"/>
+              <a:t>(</a:t>
+            </a:r>
+            <a:r>
+              <a:rPr lang="en-US" sz="1600" u="sng" dirty="0" err="1"/>
+              <a:t>var</a:t>
+            </a:r>
+            <a:r>
+              <a:rPr lang="en-US" sz="1600" u="sng" dirty="0"/>
+              <a:t> - mean)))</a:t>
+            </a:r>
+          </a:p>
+          <a:p>
+            <a:r>
+              <a:rPr lang="en-US" sz="1600" dirty="0"/>
+              <a:t>    #    </a:t>
+            </a:r>
+            <a:r>
+              <a:rPr lang="en-US" sz="1600" dirty="0" err="1"/>
+              <a:t>tf.summary.scalar</a:t>
+            </a:r>
+            <a:r>
+              <a:rPr lang="en-US" sz="1600" dirty="0"/>
+              <a:t>('</a:t>
+            </a:r>
+            <a:r>
+              <a:rPr lang="en-US" sz="1600" u="sng" dirty="0" err="1"/>
+              <a:t>stddev</a:t>
+            </a:r>
+            <a:r>
+              <a:rPr lang="en-US" sz="1600" u="sng" dirty="0"/>
+              <a:t>', </a:t>
+            </a:r>
+            <a:r>
+              <a:rPr lang="en-US" sz="1600" u="sng" dirty="0" err="1"/>
+              <a:t>stddev</a:t>
+            </a:r>
+            <a:r>
+              <a:rPr lang="en-US" sz="1600" u="sng" dirty="0"/>
+              <a:t>)</a:t>
+            </a:r>
+          </a:p>
+          <a:p>
+            <a:r>
+              <a:rPr lang="en-US" sz="1600" dirty="0"/>
+              <a:t>    #    </a:t>
+            </a:r>
+            <a:r>
+              <a:rPr lang="en-US" sz="1600" dirty="0" err="1"/>
+              <a:t>tf.summary.scalar</a:t>
+            </a:r>
+            <a:r>
+              <a:rPr lang="en-US" sz="1600" dirty="0"/>
+              <a:t>('max', </a:t>
+            </a:r>
+            <a:r>
+              <a:rPr lang="en-US" sz="1600" dirty="0" err="1"/>
+              <a:t>tf.reduce_max</a:t>
+            </a:r>
+            <a:r>
+              <a:rPr lang="en-US" sz="1600" dirty="0"/>
+              <a:t>(</a:t>
+            </a:r>
+            <a:r>
+              <a:rPr lang="en-US" sz="1600" u="sng" dirty="0" err="1"/>
+              <a:t>var</a:t>
+            </a:r>
+            <a:r>
+              <a:rPr lang="en-US" sz="1600" u="sng" dirty="0"/>
+              <a:t>))</a:t>
+            </a:r>
+          </a:p>
+          <a:p>
+            <a:r>
+              <a:rPr lang="en-US" sz="1600" dirty="0"/>
+              <a:t>    #    </a:t>
+            </a:r>
+            <a:r>
+              <a:rPr lang="en-US" sz="1600" dirty="0" err="1"/>
+              <a:t>tf.summary.scalar</a:t>
+            </a:r>
+            <a:r>
+              <a:rPr lang="en-US" sz="1600" dirty="0"/>
+              <a:t>('</a:t>
+            </a:r>
+            <a:r>
+              <a:rPr lang="en-US" sz="1600" u="sng" dirty="0"/>
+              <a:t>min', </a:t>
+            </a:r>
+            <a:r>
+              <a:rPr lang="en-US" sz="1600" u="sng" dirty="0" err="1"/>
+              <a:t>tf.reduce_min</a:t>
+            </a:r>
+            <a:r>
+              <a:rPr lang="en-US" sz="1600" u="sng" dirty="0"/>
+              <a:t>(</a:t>
+            </a:r>
+            <a:r>
+              <a:rPr lang="en-US" sz="1600" u="sng" dirty="0" err="1"/>
+              <a:t>var</a:t>
+            </a:r>
+            <a:r>
+              <a:rPr lang="en-US" sz="1600" u="sng" dirty="0"/>
+              <a:t>))</a:t>
+            </a:r>
+          </a:p>
+          <a:p>
+            <a:r>
+              <a:rPr lang="en-US" sz="1600" dirty="0"/>
+              <a:t>        </a:t>
+            </a:r>
+            <a:r>
+              <a:rPr lang="en-US" sz="1600" dirty="0" err="1"/>
+              <a:t>tf.summary.histogram</a:t>
+            </a:r>
+            <a:r>
+              <a:rPr lang="en-US" sz="1600" dirty="0"/>
+              <a:t>(</a:t>
+            </a:r>
+            <a:r>
+              <a:rPr lang="en-US" sz="1600" i="1" dirty="0"/>
+              <a:t>'histogram', </a:t>
             </a:r>
             <a:r>
               <a:rPr lang="en-US" sz="1600" i="1" dirty="0" err="1"/>
-              <a:t>modelExport</a:t>
+              <a:t>var</a:t>
             </a:r>
             <a:r>
               <a:rPr lang="en-US" sz="1600" i="1" dirty="0"/>
-              <a:t>/</a:t>
-            </a:r>
-            <a:r>
-              <a:rPr lang="en-US" sz="1600" i="1" dirty="0" err="1"/>
-              <a:t>MNISTmodel</a:t>
-            </a:r>
-            <a:r>
-              <a:rPr lang="en-US" sz="1600" i="1" dirty="0"/>
-              <a:t>')</a:t>
-            </a:r>
-          </a:p>
-          <a:p>
+              <a:t>)</a:t>
+            </a:r>
             <a:endParaRPr lang="en-US" sz="1600" dirty="0"/>
-          </a:p>
-          <a:p>
-            <a:r>
-              <a:rPr lang="en-US" sz="1600" dirty="0" err="1"/>
-              <a:t>session.close</a:t>
-            </a:r>
-            <a:r>
-              <a:rPr lang="en-US" sz="1600" dirty="0"/>
-              <a:t>()</a:t>
-            </a:r>
           </a:p>
         </p:txBody>
       </p:sp>
     </p:spTree>
     <p:extLst>
       <p:ext uri="{BB962C8B-B14F-4D97-AF65-F5344CB8AC3E}">
-        <p14:creationId xmlns:p14="http://schemas.microsoft.com/office/powerpoint/2010/main" val="3548032399"/>
+        <p14:creationId xmlns:p14="http://schemas.microsoft.com/office/powerpoint/2010/main" val="3259761947"/>
       </p:ext>
     </p:extLst>
   </p:cSld>
@@ -22894,13 +23037,8 @@
             </a:br>
             <a:r>
               <a:rPr lang="en-US" sz="1600" dirty="0"/>
-              <a:t>prepare a datafile for </a:t>
-            </a:r>
-            <a:r>
-              <a:rPr lang="en-US" sz="1600" dirty="0" err="1"/>
-              <a:t>tensorboard</a:t>
-            </a:r>
-            <a:endParaRPr lang="en-US" sz="1600" dirty="0"/>
+              <a:t>create a session and arrange to save resultant model</a:t>
+            </a:r>
           </a:p>
         </p:txBody>
       </p:sp>
@@ -22919,7 +23057,7 @@
         <p:spPr>
           <a:xfrm>
             <a:off x="1141412" y="2150364"/>
-            <a:ext cx="10266285" cy="2062103"/>
+            <a:ext cx="10266285" cy="3785652"/>
           </a:xfrm>
           <a:prstGeom prst="rect">
             <a:avLst/>
@@ -22934,21 +23072,13 @@
           <a:p>
             <a:r>
               <a:rPr lang="en-US" sz="1600" dirty="0"/>
-              <a:t># prepare to save </a:t>
-            </a:r>
+              <a:t># we want to be able to save the results of our trained model</a:t>
+            </a:r>
+          </a:p>
+          <a:p>
             <a:r>
               <a:rPr lang="en-US" sz="1600" dirty="0" err="1"/>
-              <a:t>TensorBoard</a:t>
-            </a:r>
-            <a:r>
-              <a:rPr lang="en-US" sz="1600" dirty="0"/>
-              <a:t> metrics to files</a:t>
-            </a:r>
-          </a:p>
-          <a:p>
-            <a:r>
-              <a:rPr lang="en-US" sz="1600" dirty="0" err="1"/>
-              <a:t>mergedSummaryData</a:t>
+              <a:t>modelSaver</a:t>
             </a:r>
             <a:r>
               <a:rPr lang="en-US" sz="1600" dirty="0"/>
@@ -22956,7 +23086,7 @@
             </a:r>
             <a:r>
               <a:rPr lang="en-US" sz="1600" dirty="0" err="1"/>
-              <a:t>tf.summary.merge_all</a:t>
+              <a:t>tf.train.Saver</a:t>
             </a:r>
             <a:r>
               <a:rPr lang="en-US" sz="1600" dirty="0"/>
@@ -22964,71 +23094,26 @@
             </a:r>
           </a:p>
           <a:p>
+            <a:endParaRPr lang="en-US" sz="1600" dirty="0"/>
+          </a:p>
+          <a:p>
+            <a:r>
+              <a:rPr lang="en-US" sz="1600" dirty="0"/>
+              <a:t># we need a session in which we can execute our model</a:t>
+            </a:r>
+          </a:p>
+          <a:p>
+            <a:r>
+              <a:rPr lang="en-US" sz="1600" dirty="0"/>
+              <a:t>session = </a:t>
+            </a:r>
             <a:r>
               <a:rPr lang="en-US" sz="1600" dirty="0" err="1"/>
-              <a:t>directoryPath</a:t>
+              <a:t>tf.InteractiveSession</a:t>
             </a:r>
             <a:r>
               <a:rPr lang="en-US" sz="1600" dirty="0"/>
-              <a:t> = </a:t>
-            </a:r>
-            <a:r>
-              <a:rPr lang="en-US" sz="1600" dirty="0" err="1"/>
-              <a:t>os.getcwd</a:t>
-            </a:r>
-            <a:r>
-              <a:rPr lang="en-US" sz="1600" dirty="0"/>
-              <a:t>() + </a:t>
-            </a:r>
-            <a:r>
-              <a:rPr lang="en-US" sz="1600" i="1" dirty="0"/>
-              <a:t>"\\tensorBoard"</a:t>
-            </a:r>
-          </a:p>
-          <a:p>
-            <a:r>
-              <a:rPr lang="en-US" sz="1600" dirty="0" err="1"/>
-              <a:t>trainWriter</a:t>
-            </a:r>
-            <a:r>
-              <a:rPr lang="en-US" sz="1600" dirty="0"/>
-              <a:t> = </a:t>
-            </a:r>
-            <a:r>
-              <a:rPr lang="en-US" sz="1600" dirty="0" err="1"/>
-              <a:t>tf.summary.FileWriter</a:t>
-            </a:r>
-            <a:r>
-              <a:rPr lang="en-US" sz="1600" dirty="0"/>
-              <a:t>(</a:t>
-            </a:r>
-            <a:r>
-              <a:rPr lang="en-US" sz="1600" dirty="0" err="1"/>
-              <a:t>directoryPath</a:t>
-            </a:r>
-            <a:r>
-              <a:rPr lang="en-US" sz="1600" dirty="0"/>
-              <a:t>, </a:t>
-            </a:r>
-            <a:r>
-              <a:rPr lang="en-US" sz="1600" dirty="0" err="1"/>
-              <a:t>session.graph</a:t>
-            </a:r>
-            <a:r>
-              <a:rPr lang="en-US" sz="1600" dirty="0"/>
-              <a:t>, </a:t>
-            </a:r>
-            <a:r>
-              <a:rPr lang="en-US" sz="1600" dirty="0" err="1"/>
-              <a:t>filename_suffix</a:t>
-            </a:r>
-            <a:r>
-              <a:rPr lang="en-US" sz="1600" dirty="0"/>
-              <a:t>=</a:t>
-            </a:r>
-            <a:r>
-              <a:rPr lang="en-US" sz="1600" i="1" dirty="0"/>
-              <a:t>"training")</a:t>
+              <a:t>()</a:t>
             </a:r>
           </a:p>
           <a:p>
@@ -23049,8 +23134,93 @@
           </a:p>
           <a:p>
             <a:r>
+              <a:rPr lang="en-US" sz="1600" dirty="0"/>
+              <a:t># save trained model to disk</a:t>
+            </a:r>
+          </a:p>
+          <a:p>
+            <a:r>
+              <a:rPr lang="en-US" sz="1600" dirty="0"/>
+              <a:t>directory = </a:t>
+            </a:r>
+            <a:r>
+              <a:rPr lang="en-US" sz="1600" i="1" dirty="0"/>
+              <a:t>"</a:t>
+            </a:r>
+            <a:r>
+              <a:rPr lang="en-US" sz="1600" i="1" dirty="0" err="1"/>
+              <a:t>modelExport</a:t>
+            </a:r>
+            <a:r>
+              <a:rPr lang="en-US" sz="1600" i="1" dirty="0"/>
+              <a:t>"</a:t>
+            </a:r>
+          </a:p>
+          <a:p>
+            <a:r>
+              <a:rPr lang="en-US" sz="1600" dirty="0"/>
+              <a:t>if not </a:t>
+            </a:r>
+            <a:r>
               <a:rPr lang="en-US" sz="1600" dirty="0" err="1"/>
-              <a:t>trainWriter.close</a:t>
+              <a:t>os.path.exists</a:t>
+            </a:r>
+            <a:r>
+              <a:rPr lang="en-US" sz="1600" dirty="0"/>
+              <a:t>(directory):</a:t>
+            </a:r>
+          </a:p>
+          <a:p>
+            <a:r>
+              <a:rPr lang="en-US" sz="1600" dirty="0"/>
+              <a:t>    </a:t>
+            </a:r>
+            <a:r>
+              <a:rPr lang="en-US" sz="1600" dirty="0" err="1"/>
+              <a:t>os.makedirs</a:t>
+            </a:r>
+            <a:r>
+              <a:rPr lang="en-US" sz="1600" dirty="0"/>
+              <a:t>(directory)</a:t>
+            </a:r>
+          </a:p>
+          <a:p>
+            <a:r>
+              <a:rPr lang="en-US" sz="1600" dirty="0" err="1"/>
+              <a:t>modelSaver.save</a:t>
+            </a:r>
+            <a:r>
+              <a:rPr lang="en-US" sz="1600" dirty="0"/>
+              <a:t>(session, </a:t>
+            </a:r>
+            <a:r>
+              <a:rPr lang="en-US" sz="1600" i="1" dirty="0"/>
+              <a:t>'</a:t>
+            </a:r>
+            <a:r>
+              <a:rPr lang="en-US" sz="1600" i="1" dirty="0" err="1"/>
+              <a:t>modelExport</a:t>
+            </a:r>
+            <a:r>
+              <a:rPr lang="en-US" sz="1600" i="1" dirty="0"/>
+              <a:t>/</a:t>
+            </a:r>
+            <a:r>
+              <a:rPr lang="en-US" sz="1600" i="1" dirty="0" err="1"/>
+              <a:t>MNISTmodel</a:t>
+            </a:r>
+            <a:r>
+              <a:rPr lang="en-US" sz="1600" i="1" dirty="0"/>
+              <a:t>')</a:t>
+            </a:r>
+          </a:p>
+          <a:p>
+            <a:endParaRPr lang="en-US" sz="1600" dirty="0"/>
+          </a:p>
+          <a:p>
+            <a:r>
+              <a:rPr lang="en-US" sz="1600" dirty="0" err="1"/>
+              <a:t>session.close</a:t>
             </a:r>
             <a:r>
               <a:rPr lang="en-US" sz="1600" dirty="0"/>
@@ -23062,7 +23232,7 @@
     </p:spTree>
     <p:extLst>
       <p:ext uri="{BB962C8B-B14F-4D97-AF65-F5344CB8AC3E}">
-        <p14:creationId xmlns:p14="http://schemas.microsoft.com/office/powerpoint/2010/main" val="2510119942"/>
+        <p14:creationId xmlns:p14="http://schemas.microsoft.com/office/powerpoint/2010/main" val="3548032399"/>
       </p:ext>
     </p:extLst>
   </p:cSld>
@@ -23132,8 +23302,13 @@
             </a:br>
             <a:r>
               <a:rPr lang="en-US" sz="1600" dirty="0"/>
-              <a:t>perform model training within the session</a:t>
-            </a:r>
+              <a:t>prepare a datafile for </a:t>
+            </a:r>
+            <a:r>
+              <a:rPr lang="en-US" sz="1600" dirty="0" err="1"/>
+              <a:t>tensorboard</a:t>
+            </a:r>
+            <a:endParaRPr lang="en-US" sz="1600" dirty="0"/>
           </a:p>
         </p:txBody>
       </p:sp>
@@ -23151,8 +23326,8 @@
         </p:nvSpPr>
         <p:spPr>
           <a:xfrm>
-            <a:off x="1141412" y="1895711"/>
-            <a:ext cx="10901905" cy="5755422"/>
+            <a:off x="1141412" y="2150364"/>
+            <a:ext cx="10266285" cy="2062103"/>
           </a:xfrm>
           <a:prstGeom prst="rect">
             <a:avLst/>
@@ -23167,25 +23342,21 @@
           <a:p>
             <a:r>
               <a:rPr lang="en-US" sz="1600" dirty="0"/>
-              <a:t>for count in range(0, </a:t>
+              <a:t># prepare to save </a:t>
             </a:r>
             <a:r>
               <a:rPr lang="en-US" sz="1600" dirty="0" err="1"/>
-              <a:t>maxTrainingIterations</a:t>
+              <a:t>TensorBoard</a:t>
             </a:r>
             <a:r>
               <a:rPr lang="en-US" sz="1600" dirty="0"/>
-              <a:t>):</a:t>
-            </a:r>
-          </a:p>
-          <a:p>
-            <a:r>
-              <a:rPr lang="en-US" sz="1600" dirty="0"/>
-              <a:t>    </a:t>
-            </a:r>
+              <a:t> metrics to files</a:t>
+            </a:r>
+          </a:p>
+          <a:p>
             <a:r>
               <a:rPr lang="en-US" sz="1600" dirty="0" err="1"/>
-              <a:t>learningRateValue</a:t>
+              <a:t>mergedSummaryData</a:t>
             </a:r>
             <a:r>
               <a:rPr lang="en-US" sz="1600" dirty="0"/>
@@ -23193,53 +23364,55 @@
             </a:r>
             <a:r>
               <a:rPr lang="en-US" sz="1600" dirty="0" err="1"/>
-              <a:t>minLearningRate</a:t>
+              <a:t>tf.summary.merge_all</a:t>
             </a:r>
             <a:r>
               <a:rPr lang="en-US" sz="1600" dirty="0"/>
-              <a:t> + (</a:t>
-            </a:r>
+              <a:t>()</a:t>
+            </a:r>
+          </a:p>
+          <a:p>
             <a:r>
               <a:rPr lang="en-US" sz="1600" dirty="0" err="1"/>
-              <a:t>maxLearningRate</a:t>
+              <a:t>directoryPath</a:t>
             </a:r>
             <a:r>
               <a:rPr lang="en-US" sz="1600" dirty="0"/>
-              <a:t> - </a:t>
+              <a:t> = </a:t>
             </a:r>
             <a:r>
               <a:rPr lang="en-US" sz="1600" dirty="0" err="1"/>
-              <a:t>minLearningRate</a:t>
+              <a:t>os.getcwd</a:t>
             </a:r>
             <a:r>
               <a:rPr lang="en-US" sz="1600" dirty="0"/>
-              <a:t>) * </a:t>
-            </a:r>
+              <a:t>() + </a:t>
+            </a:r>
+            <a:r>
+              <a:rPr lang="en-US" sz="1600" i="1" dirty="0"/>
+              <a:t>"\\tensorBoard"</a:t>
+            </a:r>
+          </a:p>
+          <a:p>
             <a:r>
               <a:rPr lang="en-US" sz="1600" dirty="0" err="1"/>
-              <a:t>math.exp</a:t>
+              <a:t>trainWriter</a:t>
             </a:r>
             <a:r>
               <a:rPr lang="en-US" sz="1600" dirty="0"/>
-              <a:t>(-count/</a:t>
+              <a:t> = </a:t>
             </a:r>
             <a:r>
               <a:rPr lang="en-US" sz="1600" dirty="0" err="1"/>
-              <a:t>learningRateDecaySpeed</a:t>
+              <a:t>tf.summary.FileWriter</a:t>
             </a:r>
             <a:r>
               <a:rPr lang="en-US" sz="1600" dirty="0"/>
-              <a:t>) </a:t>
-            </a:r>
-          </a:p>
-          <a:p>
-            <a:r>
-              <a:rPr lang="en-US" sz="1600" dirty="0"/>
-              <a:t>    </a:t>
+              <a:t>(</a:t>
             </a:r>
             <a:r>
               <a:rPr lang="en-US" sz="1600" dirty="0" err="1"/>
-              <a:t>batchTrainFeatures</a:t>
+              <a:t>directoryPath</a:t>
             </a:r>
             <a:r>
               <a:rPr lang="en-US" sz="1600" dirty="0"/>
@@ -23247,23 +23420,7 @@
             </a:r>
             <a:r>
               <a:rPr lang="en-US" sz="1600" dirty="0" err="1"/>
-              <a:t>batchTrainLabels</a:t>
-            </a:r>
-            <a:r>
-              <a:rPr lang="en-US" sz="1600" dirty="0"/>
-              <a:t> = </a:t>
-            </a:r>
-            <a:r>
-              <a:rPr lang="en-US" sz="1600" dirty="0" err="1"/>
-              <a:t>randomTrainingDataSubset</a:t>
-            </a:r>
-            <a:r>
-              <a:rPr lang="en-US" sz="1600" dirty="0"/>
-              <a:t>(</a:t>
-            </a:r>
-            <a:r>
-              <a:rPr lang="en-US" sz="1600" dirty="0" err="1"/>
-              <a:t>trainFeatures</a:t>
+              <a:t>session.graph</a:t>
             </a:r>
             <a:r>
               <a:rPr lang="en-US" sz="1600" dirty="0"/>
@@ -23271,539 +23428,41 @@
             </a:r>
             <a:r>
               <a:rPr lang="en-US" sz="1600" dirty="0" err="1"/>
-              <a:t>trainLabels</a:t>
+              <a:t>filename_suffix</a:t>
             </a:r>
             <a:r>
               <a:rPr lang="en-US" sz="1600" dirty="0"/>
-              <a:t>, </a:t>
-            </a:r>
+              <a:t>=</a:t>
+            </a:r>
+            <a:r>
+              <a:rPr lang="en-US" sz="1600" i="1" dirty="0"/>
+              <a:t>"training")</a:t>
+            </a:r>
+          </a:p>
+          <a:p>
+            <a:endParaRPr lang="en-US" sz="1600" dirty="0"/>
+          </a:p>
+          <a:p>
+            <a:r>
+              <a:rPr lang="en-US" sz="1600" i="1" dirty="0">
+                <a:solidFill>
+                  <a:srgbClr val="FFFF00"/>
+                </a:solidFill>
+              </a:rPr>
+              <a:t>&lt; PERFORM MODEL TRAINING HERE&gt;</a:t>
+            </a:r>
+          </a:p>
+          <a:p>
+            <a:endParaRPr lang="en-US" sz="1600" dirty="0"/>
+          </a:p>
+          <a:p>
             <a:r>
               <a:rPr lang="en-US" sz="1600" dirty="0" err="1"/>
-              <a:t>numFeatureBatches</a:t>
+              <a:t>trainWriter.close</a:t>
             </a:r>
             <a:r>
               <a:rPr lang="en-US" sz="1600" dirty="0"/>
-              <a:t>)</a:t>
-            </a:r>
-          </a:p>
-          <a:p>
-            <a:r>
-              <a:rPr lang="en-US" sz="1600" dirty="0"/>
-              <a:t>    </a:t>
-            </a:r>
-            <a:r>
-              <a:rPr lang="en-US" sz="1600" dirty="0" err="1"/>
-              <a:t>session.run</a:t>
-            </a:r>
-            <a:r>
-              <a:rPr lang="en-US" sz="1600" dirty="0"/>
-              <a:t>(training, </a:t>
-            </a:r>
-            <a:r>
-              <a:rPr lang="en-US" sz="1600" dirty="0" err="1"/>
-              <a:t>feed_dict</a:t>
-            </a:r>
-            <a:r>
-              <a:rPr lang="en-US" sz="1600" dirty="0"/>
-              <a:t>={features: </a:t>
-            </a:r>
-            <a:r>
-              <a:rPr lang="en-US" sz="1600" dirty="0" err="1"/>
-              <a:t>batchTrainFeatures</a:t>
-            </a:r>
-            <a:r>
-              <a:rPr lang="en-US" sz="1600" dirty="0"/>
-              <a:t>, labels: </a:t>
-            </a:r>
-            <a:r>
-              <a:rPr lang="en-US" sz="1600" dirty="0" err="1"/>
-              <a:t>batchTrainLabels</a:t>
-            </a:r>
-            <a:r>
-              <a:rPr lang="en-US" sz="1600" dirty="0"/>
-              <a:t>, </a:t>
-            </a:r>
-            <a:r>
-              <a:rPr lang="en-US" sz="1600" dirty="0" err="1"/>
-              <a:t>learningRate</a:t>
-            </a:r>
-            <a:r>
-              <a:rPr lang="en-US" sz="1600" dirty="0"/>
-              <a:t>: </a:t>
-            </a:r>
-            <a:r>
-              <a:rPr lang="en-US" sz="1600" dirty="0" err="1"/>
-              <a:t>learningRateValue</a:t>
-            </a:r>
-            <a:r>
-              <a:rPr lang="en-US" sz="1600" dirty="0"/>
-              <a:t>})</a:t>
-            </a:r>
-          </a:p>
-          <a:p>
-            <a:r>
-              <a:rPr lang="en-US" sz="1600" dirty="0"/>
-              <a:t>        </a:t>
-            </a:r>
-          </a:p>
-          <a:p>
-            <a:r>
-              <a:rPr lang="en-US" sz="1600" dirty="0"/>
-              <a:t>    if count%100 == 0:    </a:t>
-            </a:r>
-          </a:p>
-          <a:p>
-            <a:r>
-              <a:rPr lang="en-US" sz="1600" dirty="0"/>
-              <a:t>        # check the accuracy of our model (on test data) as we iterate      </a:t>
-            </a:r>
-          </a:p>
-          <a:p>
-            <a:r>
-              <a:rPr lang="en-US" sz="1600" dirty="0"/>
-              <a:t>        </a:t>
-            </a:r>
-            <a:r>
-              <a:rPr lang="en-US" sz="1600" dirty="0" err="1"/>
-              <a:t>correctPrediction</a:t>
-            </a:r>
-            <a:r>
-              <a:rPr lang="en-US" sz="1600" dirty="0"/>
-              <a:t> = </a:t>
-            </a:r>
-            <a:r>
-              <a:rPr lang="en-US" sz="1600" dirty="0" err="1"/>
-              <a:t>tf.equal</a:t>
-            </a:r>
-            <a:r>
-              <a:rPr lang="en-US" sz="1600" dirty="0"/>
-              <a:t>(</a:t>
-            </a:r>
-            <a:r>
-              <a:rPr lang="en-US" sz="1600" dirty="0" err="1"/>
-              <a:t>tf.argmax</a:t>
-            </a:r>
-            <a:r>
-              <a:rPr lang="en-US" sz="1600" dirty="0"/>
-              <a:t>(predictedLabels,1), </a:t>
-            </a:r>
-            <a:r>
-              <a:rPr lang="en-US" sz="1600" dirty="0" err="1"/>
-              <a:t>tf.argmax</a:t>
-            </a:r>
-            <a:r>
-              <a:rPr lang="en-US" sz="1600" dirty="0"/>
-              <a:t>(labels,1))</a:t>
-            </a:r>
-          </a:p>
-          <a:p>
-            <a:r>
-              <a:rPr lang="en-US" sz="1600" dirty="0"/>
-              <a:t>        </a:t>
-            </a:r>
-          </a:p>
-          <a:p>
-            <a:r>
-              <a:rPr lang="en-US" sz="1600" dirty="0"/>
-              <a:t>        </a:t>
-            </a:r>
-            <a:r>
-              <a:rPr lang="en-US" sz="1600" dirty="0" err="1"/>
-              <a:t>trainDataAccuracy</a:t>
-            </a:r>
-            <a:r>
-              <a:rPr lang="en-US" sz="1600" dirty="0"/>
-              <a:t> = </a:t>
-            </a:r>
-            <a:r>
-              <a:rPr lang="en-US" sz="1600" dirty="0" err="1"/>
-              <a:t>tf.reduce_mean</a:t>
-            </a:r>
-            <a:r>
-              <a:rPr lang="en-US" sz="1600" dirty="0"/>
-              <a:t>(</a:t>
-            </a:r>
-            <a:r>
-              <a:rPr lang="en-US" sz="1600" dirty="0" err="1"/>
-              <a:t>tf.cast</a:t>
-            </a:r>
-            <a:r>
-              <a:rPr lang="en-US" sz="1600" dirty="0"/>
-              <a:t>(</a:t>
-            </a:r>
-            <a:r>
-              <a:rPr lang="en-US" sz="1600" dirty="0" err="1"/>
-              <a:t>correctPrediction</a:t>
-            </a:r>
-            <a:r>
-              <a:rPr lang="en-US" sz="1600" dirty="0"/>
-              <a:t>, tf.float32))</a:t>
-            </a:r>
-          </a:p>
-          <a:p>
-            <a:r>
-              <a:rPr lang="en-US" sz="1600" dirty="0"/>
-              <a:t>        </a:t>
-            </a:r>
-            <a:r>
-              <a:rPr lang="en-US" sz="1600" dirty="0" err="1"/>
-              <a:t>trainDataAccuracy</a:t>
-            </a:r>
-            <a:r>
-              <a:rPr lang="en-US" sz="1600" dirty="0"/>
-              <a:t> = </a:t>
-            </a:r>
-            <a:r>
-              <a:rPr lang="en-US" sz="1600" dirty="0" err="1"/>
-              <a:t>session.run</a:t>
-            </a:r>
-            <a:r>
-              <a:rPr lang="en-US" sz="1600" dirty="0"/>
-              <a:t>(</a:t>
-            </a:r>
-            <a:r>
-              <a:rPr lang="en-US" sz="1600" dirty="0" err="1"/>
-              <a:t>trainDataAccuracy</a:t>
-            </a:r>
-            <a:r>
-              <a:rPr lang="en-US" sz="1600" dirty="0"/>
-              <a:t>, </a:t>
-            </a:r>
-            <a:r>
-              <a:rPr lang="en-US" sz="1600" dirty="0" err="1"/>
-              <a:t>feed_dict</a:t>
-            </a:r>
-            <a:r>
-              <a:rPr lang="en-US" sz="1600" dirty="0"/>
-              <a:t>={features: </a:t>
-            </a:r>
-            <a:r>
-              <a:rPr lang="en-US" sz="1600" dirty="0" err="1"/>
-              <a:t>trainFeatures</a:t>
-            </a:r>
-            <a:r>
-              <a:rPr lang="en-US" sz="1600" dirty="0"/>
-              <a:t>, labels: </a:t>
-            </a:r>
-            <a:r>
-              <a:rPr lang="en-US" sz="1600" dirty="0" err="1"/>
-              <a:t>trainLabels</a:t>
-            </a:r>
-            <a:r>
-              <a:rPr lang="en-US" sz="1600" dirty="0"/>
-              <a:t>})</a:t>
-            </a:r>
-          </a:p>
-          <a:p>
-            <a:r>
-              <a:rPr lang="en-US" sz="1600" dirty="0"/>
-              <a:t>        </a:t>
-            </a:r>
-          </a:p>
-          <a:p>
-            <a:r>
-              <a:rPr lang="en-US" sz="1600" dirty="0"/>
-              <a:t>        </a:t>
-            </a:r>
-            <a:r>
-              <a:rPr lang="en-US" sz="1600" dirty="0" err="1"/>
-              <a:t>testDataAccuracy</a:t>
-            </a:r>
-            <a:r>
-              <a:rPr lang="en-US" sz="1600" dirty="0"/>
-              <a:t> = </a:t>
-            </a:r>
-            <a:r>
-              <a:rPr lang="en-US" sz="1600" dirty="0" err="1"/>
-              <a:t>tf.reduce_mean</a:t>
-            </a:r>
-            <a:r>
-              <a:rPr lang="en-US" sz="1600" dirty="0"/>
-              <a:t>(</a:t>
-            </a:r>
-            <a:r>
-              <a:rPr lang="en-US" sz="1600" dirty="0" err="1"/>
-              <a:t>tf.cast</a:t>
-            </a:r>
-            <a:r>
-              <a:rPr lang="en-US" sz="1600" dirty="0"/>
-              <a:t>(</a:t>
-            </a:r>
-            <a:r>
-              <a:rPr lang="en-US" sz="1600" dirty="0" err="1"/>
-              <a:t>correctPrediction</a:t>
-            </a:r>
-            <a:r>
-              <a:rPr lang="en-US" sz="1600" dirty="0"/>
-              <a:t>, tf.float32))</a:t>
-            </a:r>
-          </a:p>
-          <a:p>
-            <a:r>
-              <a:rPr lang="en-US" sz="1600" dirty="0"/>
-              <a:t>        </a:t>
-            </a:r>
-            <a:r>
-              <a:rPr lang="en-US" sz="1600" dirty="0" err="1"/>
-              <a:t>testDataAccuracy</a:t>
-            </a:r>
-            <a:r>
-              <a:rPr lang="en-US" sz="1600" dirty="0"/>
-              <a:t> = </a:t>
-            </a:r>
-            <a:r>
-              <a:rPr lang="en-US" sz="1600" dirty="0" err="1"/>
-              <a:t>session.run</a:t>
-            </a:r>
-            <a:r>
-              <a:rPr lang="en-US" sz="1600" dirty="0"/>
-              <a:t>(</a:t>
-            </a:r>
-            <a:r>
-              <a:rPr lang="en-US" sz="1600" dirty="0" err="1"/>
-              <a:t>testDataAccuracy</a:t>
-            </a:r>
-            <a:r>
-              <a:rPr lang="en-US" sz="1600" dirty="0"/>
-              <a:t>, </a:t>
-            </a:r>
-            <a:r>
-              <a:rPr lang="en-US" sz="1600" dirty="0" err="1"/>
-              <a:t>feed_dict</a:t>
-            </a:r>
-            <a:r>
-              <a:rPr lang="en-US" sz="1600" dirty="0"/>
-              <a:t>={features: </a:t>
-            </a:r>
-            <a:r>
-              <a:rPr lang="en-US" sz="1600" dirty="0" err="1"/>
-              <a:t>testFeatures</a:t>
-            </a:r>
-            <a:r>
-              <a:rPr lang="en-US" sz="1600" dirty="0"/>
-              <a:t>, labels: </a:t>
-            </a:r>
-            <a:r>
-              <a:rPr lang="en-US" sz="1600" dirty="0" err="1"/>
-              <a:t>testLabels</a:t>
-            </a:r>
-            <a:r>
-              <a:rPr lang="en-US" sz="1600" dirty="0"/>
-              <a:t>})</a:t>
-            </a:r>
-          </a:p>
-          <a:p>
-            <a:r>
-              <a:rPr lang="en-US" sz="1600" dirty="0"/>
-              <a:t>        </a:t>
-            </a:r>
-          </a:p>
-          <a:p>
-            <a:r>
-              <a:rPr lang="en-US" sz="1600" dirty="0"/>
-              <a:t>        # save </a:t>
-            </a:r>
-            <a:r>
-              <a:rPr lang="en-US" sz="1600" dirty="0" err="1"/>
-              <a:t>TensorBoard</a:t>
-            </a:r>
-            <a:r>
-              <a:rPr lang="en-US" sz="1600" dirty="0"/>
-              <a:t> data</a:t>
-            </a:r>
-          </a:p>
-          <a:p>
-            <a:r>
-              <a:rPr lang="en-US" sz="1600" dirty="0"/>
-              <a:t>        </a:t>
-            </a:r>
-            <a:r>
-              <a:rPr lang="en-US" sz="1600" dirty="0" err="1"/>
-              <a:t>trainSummary</a:t>
-            </a:r>
-            <a:r>
-              <a:rPr lang="en-US" sz="1600" dirty="0"/>
-              <a:t> = </a:t>
-            </a:r>
-            <a:r>
-              <a:rPr lang="en-US" sz="1600" dirty="0" err="1"/>
-              <a:t>session.run</a:t>
-            </a:r>
-            <a:r>
-              <a:rPr lang="en-US" sz="1600" dirty="0"/>
-              <a:t>(</a:t>
-            </a:r>
-            <a:r>
-              <a:rPr lang="en-US" sz="1600" dirty="0" err="1"/>
-              <a:t>mergedSummaryData</a:t>
-            </a:r>
-            <a:r>
-              <a:rPr lang="en-US" sz="1600" dirty="0"/>
-              <a:t>, </a:t>
-            </a:r>
-            <a:r>
-              <a:rPr lang="en-US" sz="1600" dirty="0" err="1"/>
-              <a:t>feed_dict</a:t>
-            </a:r>
-            <a:r>
-              <a:rPr lang="en-US" sz="1600" dirty="0"/>
-              <a:t>={features: </a:t>
-            </a:r>
-            <a:r>
-              <a:rPr lang="en-US" sz="1600" dirty="0" err="1"/>
-              <a:t>batchTrainFeatures</a:t>
-            </a:r>
-            <a:r>
-              <a:rPr lang="en-US" sz="1600" dirty="0"/>
-              <a:t>, labels: </a:t>
-            </a:r>
-            <a:r>
-              <a:rPr lang="en-US" sz="1600" dirty="0" err="1"/>
-              <a:t>batchTrainLabels</a:t>
-            </a:r>
-            <a:r>
-              <a:rPr lang="en-US" sz="1600" dirty="0"/>
-              <a:t>, 			    </a:t>
-            </a:r>
-            <a:r>
-              <a:rPr lang="en-US" sz="1600" dirty="0" err="1"/>
-              <a:t>learningRate</a:t>
-            </a:r>
-            <a:r>
-              <a:rPr lang="en-US" sz="1600" dirty="0"/>
-              <a:t>: </a:t>
-            </a:r>
-            <a:r>
-              <a:rPr lang="en-US" sz="1600" dirty="0" err="1"/>
-              <a:t>learningRateValue</a:t>
-            </a:r>
-            <a:r>
-              <a:rPr lang="en-US" sz="1600" dirty="0"/>
-              <a:t>, </a:t>
-            </a:r>
-            <a:r>
-              <a:rPr lang="en-US" sz="1600" dirty="0" err="1"/>
-              <a:t>trainAccuracy</a:t>
-            </a:r>
-            <a:r>
-              <a:rPr lang="en-US" sz="1600" dirty="0"/>
-              <a:t>: </a:t>
-            </a:r>
-            <a:r>
-              <a:rPr lang="en-US" sz="1600" dirty="0" err="1"/>
-              <a:t>trainDataAccuracy</a:t>
-            </a:r>
-            <a:r>
-              <a:rPr lang="en-US" sz="1600" dirty="0"/>
-              <a:t>, </a:t>
-            </a:r>
-            <a:r>
-              <a:rPr lang="en-US" sz="1600" dirty="0" err="1"/>
-              <a:t>testAccuracy</a:t>
-            </a:r>
-            <a:r>
-              <a:rPr lang="en-US" sz="1600" dirty="0"/>
-              <a:t>: </a:t>
-            </a:r>
-            <a:r>
-              <a:rPr lang="en-US" sz="1600" dirty="0" err="1"/>
-              <a:t>testDataAccuracy</a:t>
-            </a:r>
-            <a:r>
-              <a:rPr lang="en-US" sz="1600" dirty="0"/>
-              <a:t>})</a:t>
-            </a:r>
-          </a:p>
-          <a:p>
-            <a:r>
-              <a:rPr lang="en-US" sz="1600" dirty="0"/>
-              <a:t>        </a:t>
-            </a:r>
-            <a:r>
-              <a:rPr lang="en-US" sz="1600" dirty="0" err="1"/>
-              <a:t>trainWriter.add_summary</a:t>
-            </a:r>
-            <a:r>
-              <a:rPr lang="en-US" sz="1600" dirty="0"/>
-              <a:t>(</a:t>
-            </a:r>
-            <a:r>
-              <a:rPr lang="en-US" sz="1600" dirty="0" err="1"/>
-              <a:t>trainSummary</a:t>
-            </a:r>
-            <a:r>
-              <a:rPr lang="en-US" sz="1600" dirty="0"/>
-              <a:t>, count)</a:t>
-            </a:r>
-          </a:p>
-          <a:p>
-            <a:r>
-              <a:rPr lang="en-US" sz="1600" dirty="0"/>
-              <a:t>        </a:t>
-            </a:r>
-          </a:p>
-          <a:p>
-            <a:r>
-              <a:rPr lang="en-US" sz="1600" dirty="0"/>
-              <a:t>        print(</a:t>
-            </a:r>
-            <a:r>
-              <a:rPr lang="en-US" sz="1600" i="1" dirty="0"/>
-              <a:t>"iteration %4d: training accuracy=%5.4f, testing accuracy=%5.4f, </a:t>
-            </a:r>
-            <a:r>
-              <a:rPr lang="en-US" sz="1600" i="1" dirty="0" err="1"/>
-              <a:t>learningRate</a:t>
-            </a:r>
-            <a:r>
-              <a:rPr lang="en-US" sz="1600" i="1" dirty="0"/>
-              <a:t>=%5.4f, </a:t>
-            </a:r>
-            <a:r>
-              <a:rPr lang="en-US" sz="1600" i="1" dirty="0" err="1"/>
-              <a:t>trainingTimeHours</a:t>
-            </a:r>
-            <a:r>
-              <a:rPr lang="en-US" sz="1600" i="1" dirty="0"/>
-              <a:t>=%5.2f" % (count, </a:t>
-            </a:r>
-            <a:r>
-              <a:rPr lang="en-US" sz="1600" i="1" dirty="0" err="1"/>
-              <a:t>trainDataAccuracy</a:t>
-            </a:r>
-            <a:r>
-              <a:rPr lang="en-US" sz="1600" i="1" dirty="0"/>
-              <a:t>, </a:t>
-            </a:r>
-            <a:r>
-              <a:rPr lang="en-US" sz="1600" i="1" dirty="0" err="1"/>
-              <a:t>testDataAccuracy</a:t>
-            </a:r>
-            <a:r>
-              <a:rPr lang="en-US" sz="1600" i="1" dirty="0"/>
-              <a:t>, </a:t>
-            </a:r>
-            <a:r>
-              <a:rPr lang="en-US" sz="1600" i="1" dirty="0" err="1"/>
-              <a:t>learningRateValue</a:t>
-            </a:r>
-            <a:r>
-              <a:rPr lang="en-US" sz="1600" i="1" dirty="0"/>
-              <a:t>, </a:t>
-            </a:r>
-            <a:r>
-              <a:rPr lang="en-US" sz="1600" i="1" dirty="0" err="1"/>
-              <a:t>trainingTimeHours</a:t>
-            </a:r>
-            <a:r>
-              <a:rPr lang="en-US" sz="1600" i="1" dirty="0"/>
-              <a:t>))</a:t>
-            </a:r>
-          </a:p>
-          <a:p>
-            <a:r>
-              <a:rPr lang="en-US" sz="1600" dirty="0"/>
-              <a:t> </a:t>
+              <a:t>()</a:t>
             </a:r>
           </a:p>
         </p:txBody>
@@ -23811,7 +23470,7 @@
     </p:spTree>
     <p:extLst>
       <p:ext uri="{BB962C8B-B14F-4D97-AF65-F5344CB8AC3E}">
-        <p14:creationId xmlns:p14="http://schemas.microsoft.com/office/powerpoint/2010/main" val="3761487816"/>
+        <p14:creationId xmlns:p14="http://schemas.microsoft.com/office/powerpoint/2010/main" val="2510119942"/>
       </p:ext>
     </p:extLst>
   </p:cSld>
@@ -23880,6 +23539,755 @@
               <a:rPr lang="en-US" dirty="0"/>
             </a:br>
             <a:r>
+              <a:rPr lang="en-US" sz="1600" dirty="0"/>
+              <a:t>perform model training within the session</a:t>
+            </a:r>
+          </a:p>
+        </p:txBody>
+      </p:sp>
+      <p:sp>
+        <p:nvSpPr>
+          <p:cNvPr id="101" name="TextBox 100">
+            <a:extLst>
+              <a:ext uri="{FF2B5EF4-FFF2-40B4-BE49-F238E27FC236}">
+                <a16:creationId xmlns:a16="http://schemas.microsoft.com/office/drawing/2014/main" id="{7E5FA93A-E4F5-4DBF-90F7-C99F40568C42}"/>
+              </a:ext>
+            </a:extLst>
+          </p:cNvPr>
+          <p:cNvSpPr txBox="1"/>
+          <p:nvPr/>
+        </p:nvSpPr>
+        <p:spPr>
+          <a:xfrm>
+            <a:off x="1141412" y="1895711"/>
+            <a:ext cx="10901905" cy="5755422"/>
+          </a:xfrm>
+          <a:prstGeom prst="rect">
+            <a:avLst/>
+          </a:prstGeom>
+          <a:noFill/>
+        </p:spPr>
+        <p:txBody>
+          <a:bodyPr wrap="square" rtlCol="0">
+            <a:spAutoFit/>
+          </a:bodyPr>
+          <a:lstStyle/>
+          <a:p>
+            <a:r>
+              <a:rPr lang="en-US" sz="1600" dirty="0"/>
+              <a:t>for count in range(0, </a:t>
+            </a:r>
+            <a:r>
+              <a:rPr lang="en-US" sz="1600" dirty="0" err="1"/>
+              <a:t>maxTrainingIterations</a:t>
+            </a:r>
+            <a:r>
+              <a:rPr lang="en-US" sz="1600" dirty="0"/>
+              <a:t>):</a:t>
+            </a:r>
+          </a:p>
+          <a:p>
+            <a:r>
+              <a:rPr lang="en-US" sz="1600" dirty="0"/>
+              <a:t>    </a:t>
+            </a:r>
+            <a:r>
+              <a:rPr lang="en-US" sz="1600" dirty="0" err="1"/>
+              <a:t>learningRateValue</a:t>
+            </a:r>
+            <a:r>
+              <a:rPr lang="en-US" sz="1600" dirty="0"/>
+              <a:t> = </a:t>
+            </a:r>
+            <a:r>
+              <a:rPr lang="en-US" sz="1600" dirty="0" err="1"/>
+              <a:t>minLearningRate</a:t>
+            </a:r>
+            <a:r>
+              <a:rPr lang="en-US" sz="1600" dirty="0"/>
+              <a:t> + (</a:t>
+            </a:r>
+            <a:r>
+              <a:rPr lang="en-US" sz="1600" dirty="0" err="1"/>
+              <a:t>maxLearningRate</a:t>
+            </a:r>
+            <a:r>
+              <a:rPr lang="en-US" sz="1600" dirty="0"/>
+              <a:t> - </a:t>
+            </a:r>
+            <a:r>
+              <a:rPr lang="en-US" sz="1600" dirty="0" err="1"/>
+              <a:t>minLearningRate</a:t>
+            </a:r>
+            <a:r>
+              <a:rPr lang="en-US" sz="1600" dirty="0"/>
+              <a:t>) * </a:t>
+            </a:r>
+            <a:r>
+              <a:rPr lang="en-US" sz="1600" dirty="0" err="1"/>
+              <a:t>math.exp</a:t>
+            </a:r>
+            <a:r>
+              <a:rPr lang="en-US" sz="1600" dirty="0"/>
+              <a:t>(-count/</a:t>
+            </a:r>
+            <a:r>
+              <a:rPr lang="en-US" sz="1600" dirty="0" err="1"/>
+              <a:t>learningRateDecaySpeed</a:t>
+            </a:r>
+            <a:r>
+              <a:rPr lang="en-US" sz="1600" dirty="0"/>
+              <a:t>) </a:t>
+            </a:r>
+          </a:p>
+          <a:p>
+            <a:r>
+              <a:rPr lang="en-US" sz="1600" dirty="0"/>
+              <a:t>    </a:t>
+            </a:r>
+            <a:r>
+              <a:rPr lang="en-US" sz="1600" dirty="0" err="1"/>
+              <a:t>batchTrainFeatures</a:t>
+            </a:r>
+            <a:r>
+              <a:rPr lang="en-US" sz="1600" dirty="0"/>
+              <a:t>, </a:t>
+            </a:r>
+            <a:r>
+              <a:rPr lang="en-US" sz="1600" dirty="0" err="1"/>
+              <a:t>batchTrainLabels</a:t>
+            </a:r>
+            <a:r>
+              <a:rPr lang="en-US" sz="1600" dirty="0"/>
+              <a:t> = </a:t>
+            </a:r>
+            <a:r>
+              <a:rPr lang="en-US" sz="1600" dirty="0" err="1"/>
+              <a:t>randomTrainingDataSubset</a:t>
+            </a:r>
+            <a:r>
+              <a:rPr lang="en-US" sz="1600" dirty="0"/>
+              <a:t>(</a:t>
+            </a:r>
+            <a:r>
+              <a:rPr lang="en-US" sz="1600" dirty="0" err="1"/>
+              <a:t>trainFeatures</a:t>
+            </a:r>
+            <a:r>
+              <a:rPr lang="en-US" sz="1600" dirty="0"/>
+              <a:t>, </a:t>
+            </a:r>
+            <a:r>
+              <a:rPr lang="en-US" sz="1600" dirty="0" err="1"/>
+              <a:t>trainLabels</a:t>
+            </a:r>
+            <a:r>
+              <a:rPr lang="en-US" sz="1600" dirty="0"/>
+              <a:t>, </a:t>
+            </a:r>
+            <a:r>
+              <a:rPr lang="en-US" sz="1600" dirty="0" err="1"/>
+              <a:t>numFeatureBatches</a:t>
+            </a:r>
+            <a:r>
+              <a:rPr lang="en-US" sz="1600" dirty="0"/>
+              <a:t>)</a:t>
+            </a:r>
+          </a:p>
+          <a:p>
+            <a:r>
+              <a:rPr lang="en-US" sz="1600" dirty="0"/>
+              <a:t>    </a:t>
+            </a:r>
+            <a:r>
+              <a:rPr lang="en-US" sz="1600" dirty="0" err="1"/>
+              <a:t>session.run</a:t>
+            </a:r>
+            <a:r>
+              <a:rPr lang="en-US" sz="1600" dirty="0"/>
+              <a:t>(training, </a:t>
+            </a:r>
+            <a:r>
+              <a:rPr lang="en-US" sz="1600" dirty="0" err="1"/>
+              <a:t>feed_dict</a:t>
+            </a:r>
+            <a:r>
+              <a:rPr lang="en-US" sz="1600" dirty="0"/>
+              <a:t>={features: </a:t>
+            </a:r>
+            <a:r>
+              <a:rPr lang="en-US" sz="1600" dirty="0" err="1"/>
+              <a:t>batchTrainFeatures</a:t>
+            </a:r>
+            <a:r>
+              <a:rPr lang="en-US" sz="1600" dirty="0"/>
+              <a:t>, labels: </a:t>
+            </a:r>
+            <a:r>
+              <a:rPr lang="en-US" sz="1600" dirty="0" err="1"/>
+              <a:t>batchTrainLabels</a:t>
+            </a:r>
+            <a:r>
+              <a:rPr lang="en-US" sz="1600" dirty="0"/>
+              <a:t>, </a:t>
+            </a:r>
+            <a:r>
+              <a:rPr lang="en-US" sz="1600" dirty="0" err="1"/>
+              <a:t>learningRate</a:t>
+            </a:r>
+            <a:r>
+              <a:rPr lang="en-US" sz="1600" dirty="0"/>
+              <a:t>: </a:t>
+            </a:r>
+            <a:r>
+              <a:rPr lang="en-US" sz="1600" dirty="0" err="1"/>
+              <a:t>learningRateValue</a:t>
+            </a:r>
+            <a:r>
+              <a:rPr lang="en-US" sz="1600" dirty="0"/>
+              <a:t>})</a:t>
+            </a:r>
+          </a:p>
+          <a:p>
+            <a:r>
+              <a:rPr lang="en-US" sz="1600" dirty="0"/>
+              <a:t>        </a:t>
+            </a:r>
+          </a:p>
+          <a:p>
+            <a:r>
+              <a:rPr lang="en-US" sz="1600" dirty="0"/>
+              <a:t>    if count%100 == 0:    </a:t>
+            </a:r>
+          </a:p>
+          <a:p>
+            <a:r>
+              <a:rPr lang="en-US" sz="1600" dirty="0"/>
+              <a:t>        # check the accuracy of our model (on test data) as we iterate      </a:t>
+            </a:r>
+          </a:p>
+          <a:p>
+            <a:r>
+              <a:rPr lang="en-US" sz="1600" dirty="0"/>
+              <a:t>        </a:t>
+            </a:r>
+            <a:r>
+              <a:rPr lang="en-US" sz="1600" dirty="0" err="1"/>
+              <a:t>correctPrediction</a:t>
+            </a:r>
+            <a:r>
+              <a:rPr lang="en-US" sz="1600" dirty="0"/>
+              <a:t> = </a:t>
+            </a:r>
+            <a:r>
+              <a:rPr lang="en-US" sz="1600" dirty="0" err="1"/>
+              <a:t>tf.equal</a:t>
+            </a:r>
+            <a:r>
+              <a:rPr lang="en-US" sz="1600" dirty="0"/>
+              <a:t>(</a:t>
+            </a:r>
+            <a:r>
+              <a:rPr lang="en-US" sz="1600" dirty="0" err="1"/>
+              <a:t>tf.argmax</a:t>
+            </a:r>
+            <a:r>
+              <a:rPr lang="en-US" sz="1600" dirty="0"/>
+              <a:t>(predictedLabels,1), </a:t>
+            </a:r>
+            <a:r>
+              <a:rPr lang="en-US" sz="1600" dirty="0" err="1"/>
+              <a:t>tf.argmax</a:t>
+            </a:r>
+            <a:r>
+              <a:rPr lang="en-US" sz="1600" dirty="0"/>
+              <a:t>(labels,1))</a:t>
+            </a:r>
+          </a:p>
+          <a:p>
+            <a:r>
+              <a:rPr lang="en-US" sz="1600" dirty="0"/>
+              <a:t>        </a:t>
+            </a:r>
+          </a:p>
+          <a:p>
+            <a:r>
+              <a:rPr lang="en-US" sz="1600" dirty="0"/>
+              <a:t>        </a:t>
+            </a:r>
+            <a:r>
+              <a:rPr lang="en-US" sz="1600" dirty="0" err="1"/>
+              <a:t>trainDataAccuracy</a:t>
+            </a:r>
+            <a:r>
+              <a:rPr lang="en-US" sz="1600" dirty="0"/>
+              <a:t> = </a:t>
+            </a:r>
+            <a:r>
+              <a:rPr lang="en-US" sz="1600" dirty="0" err="1"/>
+              <a:t>tf.reduce_mean</a:t>
+            </a:r>
+            <a:r>
+              <a:rPr lang="en-US" sz="1600" dirty="0"/>
+              <a:t>(</a:t>
+            </a:r>
+            <a:r>
+              <a:rPr lang="en-US" sz="1600" dirty="0" err="1"/>
+              <a:t>tf.cast</a:t>
+            </a:r>
+            <a:r>
+              <a:rPr lang="en-US" sz="1600" dirty="0"/>
+              <a:t>(</a:t>
+            </a:r>
+            <a:r>
+              <a:rPr lang="en-US" sz="1600" dirty="0" err="1"/>
+              <a:t>correctPrediction</a:t>
+            </a:r>
+            <a:r>
+              <a:rPr lang="en-US" sz="1600" dirty="0"/>
+              <a:t>, tf.float32))</a:t>
+            </a:r>
+          </a:p>
+          <a:p>
+            <a:r>
+              <a:rPr lang="en-US" sz="1600" dirty="0"/>
+              <a:t>        </a:t>
+            </a:r>
+            <a:r>
+              <a:rPr lang="en-US" sz="1600" dirty="0" err="1"/>
+              <a:t>trainDataAccuracy</a:t>
+            </a:r>
+            <a:r>
+              <a:rPr lang="en-US" sz="1600" dirty="0"/>
+              <a:t> = </a:t>
+            </a:r>
+            <a:r>
+              <a:rPr lang="en-US" sz="1600" dirty="0" err="1"/>
+              <a:t>session.run</a:t>
+            </a:r>
+            <a:r>
+              <a:rPr lang="en-US" sz="1600" dirty="0"/>
+              <a:t>(</a:t>
+            </a:r>
+            <a:r>
+              <a:rPr lang="en-US" sz="1600" dirty="0" err="1"/>
+              <a:t>trainDataAccuracy</a:t>
+            </a:r>
+            <a:r>
+              <a:rPr lang="en-US" sz="1600" dirty="0"/>
+              <a:t>, </a:t>
+            </a:r>
+            <a:r>
+              <a:rPr lang="en-US" sz="1600" dirty="0" err="1"/>
+              <a:t>feed_dict</a:t>
+            </a:r>
+            <a:r>
+              <a:rPr lang="en-US" sz="1600" dirty="0"/>
+              <a:t>={features: </a:t>
+            </a:r>
+            <a:r>
+              <a:rPr lang="en-US" sz="1600" dirty="0" err="1"/>
+              <a:t>trainFeatures</a:t>
+            </a:r>
+            <a:r>
+              <a:rPr lang="en-US" sz="1600" dirty="0"/>
+              <a:t>, labels: </a:t>
+            </a:r>
+            <a:r>
+              <a:rPr lang="en-US" sz="1600" dirty="0" err="1"/>
+              <a:t>trainLabels</a:t>
+            </a:r>
+            <a:r>
+              <a:rPr lang="en-US" sz="1600" dirty="0"/>
+              <a:t>})</a:t>
+            </a:r>
+          </a:p>
+          <a:p>
+            <a:r>
+              <a:rPr lang="en-US" sz="1600" dirty="0"/>
+              <a:t>        </a:t>
+            </a:r>
+          </a:p>
+          <a:p>
+            <a:r>
+              <a:rPr lang="en-US" sz="1600" dirty="0"/>
+              <a:t>        </a:t>
+            </a:r>
+            <a:r>
+              <a:rPr lang="en-US" sz="1600" dirty="0" err="1"/>
+              <a:t>testDataAccuracy</a:t>
+            </a:r>
+            <a:r>
+              <a:rPr lang="en-US" sz="1600" dirty="0"/>
+              <a:t> = </a:t>
+            </a:r>
+            <a:r>
+              <a:rPr lang="en-US" sz="1600" dirty="0" err="1"/>
+              <a:t>tf.reduce_mean</a:t>
+            </a:r>
+            <a:r>
+              <a:rPr lang="en-US" sz="1600" dirty="0"/>
+              <a:t>(</a:t>
+            </a:r>
+            <a:r>
+              <a:rPr lang="en-US" sz="1600" dirty="0" err="1"/>
+              <a:t>tf.cast</a:t>
+            </a:r>
+            <a:r>
+              <a:rPr lang="en-US" sz="1600" dirty="0"/>
+              <a:t>(</a:t>
+            </a:r>
+            <a:r>
+              <a:rPr lang="en-US" sz="1600" dirty="0" err="1"/>
+              <a:t>correctPrediction</a:t>
+            </a:r>
+            <a:r>
+              <a:rPr lang="en-US" sz="1600" dirty="0"/>
+              <a:t>, tf.float32))</a:t>
+            </a:r>
+          </a:p>
+          <a:p>
+            <a:r>
+              <a:rPr lang="en-US" sz="1600" dirty="0"/>
+              <a:t>        </a:t>
+            </a:r>
+            <a:r>
+              <a:rPr lang="en-US" sz="1600" dirty="0" err="1"/>
+              <a:t>testDataAccuracy</a:t>
+            </a:r>
+            <a:r>
+              <a:rPr lang="en-US" sz="1600" dirty="0"/>
+              <a:t> = </a:t>
+            </a:r>
+            <a:r>
+              <a:rPr lang="en-US" sz="1600" dirty="0" err="1"/>
+              <a:t>session.run</a:t>
+            </a:r>
+            <a:r>
+              <a:rPr lang="en-US" sz="1600" dirty="0"/>
+              <a:t>(</a:t>
+            </a:r>
+            <a:r>
+              <a:rPr lang="en-US" sz="1600" dirty="0" err="1"/>
+              <a:t>testDataAccuracy</a:t>
+            </a:r>
+            <a:r>
+              <a:rPr lang="en-US" sz="1600" dirty="0"/>
+              <a:t>, </a:t>
+            </a:r>
+            <a:r>
+              <a:rPr lang="en-US" sz="1600" dirty="0" err="1"/>
+              <a:t>feed_dict</a:t>
+            </a:r>
+            <a:r>
+              <a:rPr lang="en-US" sz="1600" dirty="0"/>
+              <a:t>={features: </a:t>
+            </a:r>
+            <a:r>
+              <a:rPr lang="en-US" sz="1600" dirty="0" err="1"/>
+              <a:t>testFeatures</a:t>
+            </a:r>
+            <a:r>
+              <a:rPr lang="en-US" sz="1600" dirty="0"/>
+              <a:t>, labels: </a:t>
+            </a:r>
+            <a:r>
+              <a:rPr lang="en-US" sz="1600" dirty="0" err="1"/>
+              <a:t>testLabels</a:t>
+            </a:r>
+            <a:r>
+              <a:rPr lang="en-US" sz="1600" dirty="0"/>
+              <a:t>})</a:t>
+            </a:r>
+          </a:p>
+          <a:p>
+            <a:r>
+              <a:rPr lang="en-US" sz="1600" dirty="0"/>
+              <a:t>        </a:t>
+            </a:r>
+          </a:p>
+          <a:p>
+            <a:r>
+              <a:rPr lang="en-US" sz="1600" dirty="0"/>
+              <a:t>        # save </a:t>
+            </a:r>
+            <a:r>
+              <a:rPr lang="en-US" sz="1600" dirty="0" err="1"/>
+              <a:t>TensorBoard</a:t>
+            </a:r>
+            <a:r>
+              <a:rPr lang="en-US" sz="1600" dirty="0"/>
+              <a:t> data</a:t>
+            </a:r>
+          </a:p>
+          <a:p>
+            <a:r>
+              <a:rPr lang="en-US" sz="1600" dirty="0"/>
+              <a:t>        </a:t>
+            </a:r>
+            <a:r>
+              <a:rPr lang="en-US" sz="1600" dirty="0" err="1"/>
+              <a:t>trainSummary</a:t>
+            </a:r>
+            <a:r>
+              <a:rPr lang="en-US" sz="1600" dirty="0"/>
+              <a:t> = </a:t>
+            </a:r>
+            <a:r>
+              <a:rPr lang="en-US" sz="1600" dirty="0" err="1"/>
+              <a:t>session.run</a:t>
+            </a:r>
+            <a:r>
+              <a:rPr lang="en-US" sz="1600" dirty="0"/>
+              <a:t>(</a:t>
+            </a:r>
+            <a:r>
+              <a:rPr lang="en-US" sz="1600" dirty="0" err="1"/>
+              <a:t>mergedSummaryData</a:t>
+            </a:r>
+            <a:r>
+              <a:rPr lang="en-US" sz="1600" dirty="0"/>
+              <a:t>, </a:t>
+            </a:r>
+            <a:r>
+              <a:rPr lang="en-US" sz="1600" dirty="0" err="1"/>
+              <a:t>feed_dict</a:t>
+            </a:r>
+            <a:r>
+              <a:rPr lang="en-US" sz="1600" dirty="0"/>
+              <a:t>={features: </a:t>
+            </a:r>
+            <a:r>
+              <a:rPr lang="en-US" sz="1600" dirty="0" err="1"/>
+              <a:t>batchTrainFeatures</a:t>
+            </a:r>
+            <a:r>
+              <a:rPr lang="en-US" sz="1600" dirty="0"/>
+              <a:t>, labels: </a:t>
+            </a:r>
+            <a:r>
+              <a:rPr lang="en-US" sz="1600" dirty="0" err="1"/>
+              <a:t>batchTrainLabels</a:t>
+            </a:r>
+            <a:r>
+              <a:rPr lang="en-US" sz="1600" dirty="0"/>
+              <a:t>, 			    </a:t>
+            </a:r>
+            <a:r>
+              <a:rPr lang="en-US" sz="1600" dirty="0" err="1"/>
+              <a:t>learningRate</a:t>
+            </a:r>
+            <a:r>
+              <a:rPr lang="en-US" sz="1600" dirty="0"/>
+              <a:t>: </a:t>
+            </a:r>
+            <a:r>
+              <a:rPr lang="en-US" sz="1600" dirty="0" err="1"/>
+              <a:t>learningRateValue</a:t>
+            </a:r>
+            <a:r>
+              <a:rPr lang="en-US" sz="1600" dirty="0"/>
+              <a:t>, </a:t>
+            </a:r>
+            <a:r>
+              <a:rPr lang="en-US" sz="1600" dirty="0" err="1"/>
+              <a:t>trainAccuracy</a:t>
+            </a:r>
+            <a:r>
+              <a:rPr lang="en-US" sz="1600" dirty="0"/>
+              <a:t>: </a:t>
+            </a:r>
+            <a:r>
+              <a:rPr lang="en-US" sz="1600" dirty="0" err="1"/>
+              <a:t>trainDataAccuracy</a:t>
+            </a:r>
+            <a:r>
+              <a:rPr lang="en-US" sz="1600" dirty="0"/>
+              <a:t>, </a:t>
+            </a:r>
+            <a:r>
+              <a:rPr lang="en-US" sz="1600" dirty="0" err="1"/>
+              <a:t>testAccuracy</a:t>
+            </a:r>
+            <a:r>
+              <a:rPr lang="en-US" sz="1600" dirty="0"/>
+              <a:t>: </a:t>
+            </a:r>
+            <a:r>
+              <a:rPr lang="en-US" sz="1600" dirty="0" err="1"/>
+              <a:t>testDataAccuracy</a:t>
+            </a:r>
+            <a:r>
+              <a:rPr lang="en-US" sz="1600" dirty="0"/>
+              <a:t>})</a:t>
+            </a:r>
+          </a:p>
+          <a:p>
+            <a:r>
+              <a:rPr lang="en-US" sz="1600" dirty="0"/>
+              <a:t>        </a:t>
+            </a:r>
+            <a:r>
+              <a:rPr lang="en-US" sz="1600" dirty="0" err="1"/>
+              <a:t>trainWriter.add_summary</a:t>
+            </a:r>
+            <a:r>
+              <a:rPr lang="en-US" sz="1600" dirty="0"/>
+              <a:t>(</a:t>
+            </a:r>
+            <a:r>
+              <a:rPr lang="en-US" sz="1600" dirty="0" err="1"/>
+              <a:t>trainSummary</a:t>
+            </a:r>
+            <a:r>
+              <a:rPr lang="en-US" sz="1600" dirty="0"/>
+              <a:t>, count)</a:t>
+            </a:r>
+          </a:p>
+          <a:p>
+            <a:r>
+              <a:rPr lang="en-US" sz="1600" dirty="0"/>
+              <a:t>        </a:t>
+            </a:r>
+          </a:p>
+          <a:p>
+            <a:r>
+              <a:rPr lang="en-US" sz="1600" dirty="0"/>
+              <a:t>        print(</a:t>
+            </a:r>
+            <a:r>
+              <a:rPr lang="en-US" sz="1600" i="1" dirty="0"/>
+              <a:t>"iteration %4d: training accuracy=%5.4f, testing accuracy=%5.4f, </a:t>
+            </a:r>
+            <a:r>
+              <a:rPr lang="en-US" sz="1600" i="1" dirty="0" err="1"/>
+              <a:t>learningRate</a:t>
+            </a:r>
+            <a:r>
+              <a:rPr lang="en-US" sz="1600" i="1" dirty="0"/>
+              <a:t>=%5.4f, </a:t>
+            </a:r>
+            <a:r>
+              <a:rPr lang="en-US" sz="1600" i="1" dirty="0" err="1"/>
+              <a:t>trainingTimeHours</a:t>
+            </a:r>
+            <a:r>
+              <a:rPr lang="en-US" sz="1600" i="1" dirty="0"/>
+              <a:t>=%5.2f" % (count, </a:t>
+            </a:r>
+            <a:r>
+              <a:rPr lang="en-US" sz="1600" i="1" dirty="0" err="1"/>
+              <a:t>trainDataAccuracy</a:t>
+            </a:r>
+            <a:r>
+              <a:rPr lang="en-US" sz="1600" i="1" dirty="0"/>
+              <a:t>, </a:t>
+            </a:r>
+            <a:r>
+              <a:rPr lang="en-US" sz="1600" i="1" dirty="0" err="1"/>
+              <a:t>testDataAccuracy</a:t>
+            </a:r>
+            <a:r>
+              <a:rPr lang="en-US" sz="1600" i="1" dirty="0"/>
+              <a:t>, </a:t>
+            </a:r>
+            <a:r>
+              <a:rPr lang="en-US" sz="1600" i="1" dirty="0" err="1"/>
+              <a:t>learningRateValue</a:t>
+            </a:r>
+            <a:r>
+              <a:rPr lang="en-US" sz="1600" i="1" dirty="0"/>
+              <a:t>, </a:t>
+            </a:r>
+            <a:r>
+              <a:rPr lang="en-US" sz="1600" i="1" dirty="0" err="1"/>
+              <a:t>trainingTimeHours</a:t>
+            </a:r>
+            <a:r>
+              <a:rPr lang="en-US" sz="1600" i="1" dirty="0"/>
+              <a:t>))</a:t>
+            </a:r>
+          </a:p>
+          <a:p>
+            <a:r>
+              <a:rPr lang="en-US" sz="1600" dirty="0"/>
+              <a:t> </a:t>
+            </a:r>
+          </a:p>
+        </p:txBody>
+      </p:sp>
+    </p:spTree>
+    <p:extLst>
+      <p:ext uri="{BB962C8B-B14F-4D97-AF65-F5344CB8AC3E}">
+        <p14:creationId xmlns:p14="http://schemas.microsoft.com/office/powerpoint/2010/main" val="3761487816"/>
+      </p:ext>
+    </p:extLst>
+  </p:cSld>
+  <p:clrMapOvr>
+    <a:masterClrMapping/>
+  </p:clrMapOvr>
+</p:sld>
+</file>
+
+<file path=ppt/slides/slide26.xml><?xml version="1.0" encoding="utf-8"?>
+<p:sld xmlns:a="http://schemas.openxmlformats.org/drawingml/2006/main" xmlns:r="http://schemas.openxmlformats.org/officeDocument/2006/relationships" xmlns:p="http://schemas.openxmlformats.org/presentationml/2006/main">
+  <p:cSld>
+    <p:spTree>
+      <p:nvGrpSpPr>
+        <p:cNvPr id="1" name=""/>
+        <p:cNvGrpSpPr/>
+        <p:nvPr/>
+      </p:nvGrpSpPr>
+      <p:grpSpPr>
+        <a:xfrm>
+          <a:off x="0" y="0"/>
+          <a:ext cx="0" cy="0"/>
+          <a:chOff x="0" y="0"/>
+          <a:chExt cx="0" cy="0"/>
+        </a:xfrm>
+      </p:grpSpPr>
+      <p:sp>
+        <p:nvSpPr>
+          <p:cNvPr id="2" name="Title 1">
+            <a:extLst>
+              <a:ext uri="{FF2B5EF4-FFF2-40B4-BE49-F238E27FC236}">
+                <a16:creationId xmlns:a16="http://schemas.microsoft.com/office/drawing/2014/main" id="{AA243B50-4CCD-456E-8D60-A64C77C89BAC}"/>
+              </a:ext>
+            </a:extLst>
+          </p:cNvPr>
+          <p:cNvSpPr>
+            <a:spLocks noGrp="1"/>
+          </p:cNvSpPr>
+          <p:nvPr>
+            <p:ph type="title"/>
+          </p:nvPr>
+        </p:nvSpPr>
+        <p:spPr>
+          <a:xfrm>
+            <a:off x="1141413" y="618518"/>
+            <a:ext cx="9905998" cy="1478570"/>
+          </a:xfrm>
+        </p:spPr>
+        <p:txBody>
+          <a:bodyPr/>
+          <a:lstStyle/>
+          <a:p>
+            <a:r>
+              <a:rPr lang="en-US" dirty="0"/>
+              <a:t>train </a:t>
+            </a:r>
+            <a:r>
+              <a:rPr lang="en-US" dirty="0" err="1"/>
+              <a:t>tensorflow</a:t>
+            </a:r>
+            <a:r>
+              <a:rPr lang="en-US" dirty="0"/>
+              <a:t> model</a:t>
+            </a:r>
+            <a:br>
+              <a:rPr lang="en-US" dirty="0"/>
+            </a:br>
+            <a:r>
               <a:rPr lang="en-US" sz="1600" dirty="0" err="1"/>
               <a:t>tensorboard</a:t>
             </a:r>
@@ -23971,7 +24379,7 @@
 </p:sld>
 </file>
 
-<file path=ppt/slides/slide26.xml><?xml version="1.0" encoding="utf-8"?>
+<file path=ppt/slides/slide27.xml><?xml version="1.0" encoding="utf-8"?>
 <p:sld xmlns:a="http://schemas.openxmlformats.org/drawingml/2006/main" xmlns:r="http://schemas.openxmlformats.org/officeDocument/2006/relationships" xmlns:p="http://schemas.openxmlformats.org/presentationml/2006/main">
   <p:cSld>
     <p:spTree>
@@ -27058,7 +27466,7 @@
           <a:p>
             <a:r>
               <a:rPr lang="en-US" dirty="0"/>
-              <a:t>You my try increasing widths until you start to overfit training data</a:t>
+              <a:t>You may try increasing widths until you start to overfit training data</a:t>
             </a:r>
           </a:p>
           <a:p>

</xml_diff>